<commit_message>
Dummy Variable Encoding is added.
</commit_message>
<xml_diff>
--- a/My Note and Practice/Text to Numerical Data Conversion/Categorical(Text to Numeric) data conversion-CTtN/CTtN2. One-Hot & Dummy Variable Encoding/One-Hot Encoding.pptx
+++ b/My Note and Practice/Text to Numerical Data Conversion/Categorical(Text to Numeric) data conversion-CTtN/CTtN2. One-Hot & Dummy Variable Encoding/One-Hot Encoding.pptx
@@ -16,6 +16,10 @@
     <p:sldId id="278" r:id="rId10"/>
     <p:sldId id="290" r:id="rId11"/>
     <p:sldId id="279" r:id="rId12"/>
+    <p:sldId id="293" r:id="rId13"/>
+    <p:sldId id="292" r:id="rId14"/>
+    <p:sldId id="294" r:id="rId15"/>
+    <p:sldId id="295" r:id="rId16"/>
   </p:sldIdLst>
   <p:sldSz cx="12192000" cy="6858000"/>
   <p:notesSz cx="6858000" cy="9144000"/>
@@ -280,7 +284,7 @@
           <a:p>
             <a:fld id="{D6171EE1-2692-479A-A6A6-950CA86052A8}" type="datetimeFigureOut">
               <a:rPr lang="en-US" smtClean="0"/>
-              <a:t>11/2/2025</a:t>
+              <a:t>11/3/2025</a:t>
             </a:fld>
             <a:endParaRPr lang="en-US"/>
           </a:p>
@@ -478,7 +482,7 @@
           <a:p>
             <a:fld id="{D6171EE1-2692-479A-A6A6-950CA86052A8}" type="datetimeFigureOut">
               <a:rPr lang="en-US" smtClean="0"/>
-              <a:t>11/2/2025</a:t>
+              <a:t>11/3/2025</a:t>
             </a:fld>
             <a:endParaRPr lang="en-US"/>
           </a:p>
@@ -686,7 +690,7 @@
           <a:p>
             <a:fld id="{D6171EE1-2692-479A-A6A6-950CA86052A8}" type="datetimeFigureOut">
               <a:rPr lang="en-US" smtClean="0"/>
-              <a:t>11/2/2025</a:t>
+              <a:t>11/3/2025</a:t>
             </a:fld>
             <a:endParaRPr lang="en-US"/>
           </a:p>
@@ -884,7 +888,7 @@
           <a:p>
             <a:fld id="{D6171EE1-2692-479A-A6A6-950CA86052A8}" type="datetimeFigureOut">
               <a:rPr lang="en-US" smtClean="0"/>
-              <a:t>11/2/2025</a:t>
+              <a:t>11/3/2025</a:t>
             </a:fld>
             <a:endParaRPr lang="en-US"/>
           </a:p>
@@ -1159,7 +1163,7 @@
           <a:p>
             <a:fld id="{D6171EE1-2692-479A-A6A6-950CA86052A8}" type="datetimeFigureOut">
               <a:rPr lang="en-US" smtClean="0"/>
-              <a:t>11/2/2025</a:t>
+              <a:t>11/3/2025</a:t>
             </a:fld>
             <a:endParaRPr lang="en-US"/>
           </a:p>
@@ -1424,7 +1428,7 @@
           <a:p>
             <a:fld id="{D6171EE1-2692-479A-A6A6-950CA86052A8}" type="datetimeFigureOut">
               <a:rPr lang="en-US" smtClean="0"/>
-              <a:t>11/2/2025</a:t>
+              <a:t>11/3/2025</a:t>
             </a:fld>
             <a:endParaRPr lang="en-US"/>
           </a:p>
@@ -1836,7 +1840,7 @@
           <a:p>
             <a:fld id="{D6171EE1-2692-479A-A6A6-950CA86052A8}" type="datetimeFigureOut">
               <a:rPr lang="en-US" smtClean="0"/>
-              <a:t>11/2/2025</a:t>
+              <a:t>11/3/2025</a:t>
             </a:fld>
             <a:endParaRPr lang="en-US"/>
           </a:p>
@@ -1977,7 +1981,7 @@
           <a:p>
             <a:fld id="{D6171EE1-2692-479A-A6A6-950CA86052A8}" type="datetimeFigureOut">
               <a:rPr lang="en-US" smtClean="0"/>
-              <a:t>11/2/2025</a:t>
+              <a:t>11/3/2025</a:t>
             </a:fld>
             <a:endParaRPr lang="en-US"/>
           </a:p>
@@ -2090,7 +2094,7 @@
           <a:p>
             <a:fld id="{D6171EE1-2692-479A-A6A6-950CA86052A8}" type="datetimeFigureOut">
               <a:rPr lang="en-US" smtClean="0"/>
-              <a:t>11/2/2025</a:t>
+              <a:t>11/3/2025</a:t>
             </a:fld>
             <a:endParaRPr lang="en-US"/>
           </a:p>
@@ -2401,7 +2405,7 @@
           <a:p>
             <a:fld id="{D6171EE1-2692-479A-A6A6-950CA86052A8}" type="datetimeFigureOut">
               <a:rPr lang="en-US" smtClean="0"/>
-              <a:t>11/2/2025</a:t>
+              <a:t>11/3/2025</a:t>
             </a:fld>
             <a:endParaRPr lang="en-US"/>
           </a:p>
@@ -2689,7 +2693,7 @@
           <a:p>
             <a:fld id="{D6171EE1-2692-479A-A6A6-950CA86052A8}" type="datetimeFigureOut">
               <a:rPr lang="en-US" smtClean="0"/>
-              <a:t>11/2/2025</a:t>
+              <a:t>11/3/2025</a:t>
             </a:fld>
             <a:endParaRPr lang="en-US"/>
           </a:p>
@@ -2930,7 +2934,7 @@
           <a:p>
             <a:fld id="{D6171EE1-2692-479A-A6A6-950CA86052A8}" type="datetimeFigureOut">
               <a:rPr lang="en-US" smtClean="0"/>
-              <a:t>11/2/2025</a:t>
+              <a:t>11/3/2025</a:t>
             </a:fld>
             <a:endParaRPr lang="en-US"/>
           </a:p>
@@ -4223,6 +4227,2865 @@
 </p:sld>
 </file>
 
+<file path=ppt/slides/slide12.xml><?xml version="1.0" encoding="utf-8"?>
+<p:sld xmlns:a="http://schemas.openxmlformats.org/drawingml/2006/main" xmlns:r="http://schemas.openxmlformats.org/officeDocument/2006/relationships" xmlns:p="http://schemas.openxmlformats.org/presentationml/2006/main">
+  <p:cSld>
+    <p:spTree>
+      <p:nvGrpSpPr>
+        <p:cNvPr id="1" name="">
+          <a:extLst>
+            <a:ext uri="{FF2B5EF4-FFF2-40B4-BE49-F238E27FC236}">
+              <a16:creationId xmlns:a16="http://schemas.microsoft.com/office/drawing/2014/main" id="{D6CD558C-5C56-50E0-00B0-0473156FF87D}"/>
+            </a:ext>
+          </a:extLst>
+        </p:cNvPr>
+        <p:cNvGrpSpPr/>
+        <p:nvPr/>
+      </p:nvGrpSpPr>
+      <p:grpSpPr>
+        <a:xfrm>
+          <a:off x="0" y="0"/>
+          <a:ext cx="0" cy="0"/>
+          <a:chOff x="0" y="0"/>
+          <a:chExt cx="0" cy="0"/>
+        </a:xfrm>
+      </p:grpSpPr>
+      <p:sp>
+        <p:nvSpPr>
+          <p:cNvPr id="5" name="TextBox 4">
+            <a:extLst>
+              <a:ext uri="{FF2B5EF4-FFF2-40B4-BE49-F238E27FC236}">
+                <a16:creationId xmlns:a16="http://schemas.microsoft.com/office/drawing/2014/main" id="{F58E2402-83DC-2A41-C9F1-1729DA62C33A}"/>
+              </a:ext>
+            </a:extLst>
+          </p:cNvPr>
+          <p:cNvSpPr txBox="1"/>
+          <p:nvPr/>
+        </p:nvSpPr>
+        <p:spPr>
+          <a:xfrm>
+            <a:off x="1597742" y="403123"/>
+            <a:ext cx="8996516" cy="646331"/>
+          </a:xfrm>
+          <a:prstGeom prst="rect">
+            <a:avLst/>
+          </a:prstGeom>
+          <a:noFill/>
+        </p:spPr>
+        <p:txBody>
+          <a:bodyPr wrap="square" rtlCol="0">
+            <a:spAutoFit/>
+          </a:bodyPr>
+          <a:lstStyle/>
+          <a:p>
+            <a:pPr algn="ctr"/>
+            <a:r>
+              <a:rPr lang="en-US" sz="3600" dirty="0">
+                <a:latin typeface="Bebas Neue" panose="020B0606020202050201" pitchFamily="34" charset="0"/>
+              </a:rPr>
+              <a:t>Then Why Dummy</a:t>
+            </a:r>
+          </a:p>
+        </p:txBody>
+      </p:sp>
+      <p:sp>
+        <p:nvSpPr>
+          <p:cNvPr id="7" name="TextBox 6">
+            <a:extLst>
+              <a:ext uri="{FF2B5EF4-FFF2-40B4-BE49-F238E27FC236}">
+                <a16:creationId xmlns:a16="http://schemas.microsoft.com/office/drawing/2014/main" id="{40B1B512-2B8C-71B6-7DFD-D21C273C7EEB}"/>
+              </a:ext>
+            </a:extLst>
+          </p:cNvPr>
+          <p:cNvSpPr txBox="1"/>
+          <p:nvPr/>
+        </p:nvSpPr>
+        <p:spPr>
+          <a:xfrm>
+            <a:off x="1597741" y="1030716"/>
+            <a:ext cx="9644881" cy="3416320"/>
+          </a:xfrm>
+          <a:prstGeom prst="rect">
+            <a:avLst/>
+          </a:prstGeom>
+          <a:noFill/>
+        </p:spPr>
+        <p:txBody>
+          <a:bodyPr wrap="square" rtlCol="0">
+            <a:spAutoFit/>
+          </a:bodyPr>
+          <a:lstStyle/>
+          <a:p>
+            <a:r>
+              <a:rPr lang="en-US" sz="2400" dirty="0">
+                <a:latin typeface="Open Sans" pitchFamily="2" charset="0"/>
+                <a:ea typeface="Open Sans" pitchFamily="2" charset="0"/>
+                <a:cs typeface="Open Sans" pitchFamily="2" charset="0"/>
+              </a:rPr>
+              <a:t>It works the same as one-hot encoding, with a slight difference</a:t>
+            </a:r>
+          </a:p>
+          <a:p>
+            <a:endParaRPr lang="en-US" sz="2400" dirty="0">
+              <a:latin typeface="Open Sans" pitchFamily="2" charset="0"/>
+              <a:ea typeface="Open Sans" pitchFamily="2" charset="0"/>
+              <a:cs typeface="Open Sans" pitchFamily="2" charset="0"/>
+            </a:endParaRPr>
+          </a:p>
+          <a:p>
+            <a:r>
+              <a:rPr lang="en-US" sz="2400" dirty="0">
+                <a:latin typeface="Open Sans" pitchFamily="2" charset="0"/>
+                <a:ea typeface="Open Sans" pitchFamily="2" charset="0"/>
+                <a:cs typeface="Open Sans" pitchFamily="2" charset="0"/>
+              </a:rPr>
+              <a:t>Unlike one-hot encoding, in this method we get Boolean columns (True/False) instead of numerical columns.</a:t>
+            </a:r>
+          </a:p>
+          <a:p>
+            <a:endParaRPr lang="en-US" sz="2400" dirty="0">
+              <a:latin typeface="Open Sans" pitchFamily="2" charset="0"/>
+              <a:ea typeface="Open Sans" pitchFamily="2" charset="0"/>
+              <a:cs typeface="Open Sans" pitchFamily="2" charset="0"/>
+            </a:endParaRPr>
+          </a:p>
+          <a:p>
+            <a:r>
+              <a:rPr lang="en-US" sz="2400" dirty="0">
+                <a:latin typeface="Open Sans" pitchFamily="2" charset="0"/>
+                <a:ea typeface="Open Sans" pitchFamily="2" charset="0"/>
+                <a:cs typeface="Open Sans" pitchFamily="2" charset="0"/>
+              </a:rPr>
+              <a:t>Although machine learning models can handle Boolean values, they generally prefer integers. This conversion can be done easily by using an argument </a:t>
+            </a:r>
+            <a:r>
+              <a:rPr lang="en-US" sz="2400" dirty="0">
+                <a:solidFill>
+                  <a:schemeClr val="accent2"/>
+                </a:solidFill>
+                <a:latin typeface="Open Sans" pitchFamily="2" charset="0"/>
+                <a:ea typeface="Open Sans" pitchFamily="2" charset="0"/>
+                <a:cs typeface="Open Sans" pitchFamily="2" charset="0"/>
+              </a:rPr>
+              <a:t>(</a:t>
+            </a:r>
+            <a:r>
+              <a:rPr lang="en-US" sz="2400" dirty="0" err="1">
+                <a:solidFill>
+                  <a:schemeClr val="accent2"/>
+                </a:solidFill>
+                <a:latin typeface="Open Sans" pitchFamily="2" charset="0"/>
+                <a:ea typeface="Open Sans" pitchFamily="2" charset="0"/>
+                <a:cs typeface="Open Sans" pitchFamily="2" charset="0"/>
+              </a:rPr>
+              <a:t>dtype</a:t>
+            </a:r>
+            <a:r>
+              <a:rPr lang="en-US" sz="2400" dirty="0">
+                <a:solidFill>
+                  <a:schemeClr val="accent2"/>
+                </a:solidFill>
+                <a:latin typeface="Open Sans" pitchFamily="2" charset="0"/>
+                <a:ea typeface="Open Sans" pitchFamily="2" charset="0"/>
+                <a:cs typeface="Open Sans" pitchFamily="2" charset="0"/>
+              </a:rPr>
+              <a:t>=int) </a:t>
+            </a:r>
+            <a:r>
+              <a:rPr lang="en-US" sz="2400" dirty="0">
+                <a:latin typeface="Open Sans" pitchFamily="2" charset="0"/>
+                <a:ea typeface="Open Sans" pitchFamily="2" charset="0"/>
+                <a:cs typeface="Open Sans" pitchFamily="2" charset="0"/>
+              </a:rPr>
+              <a:t>in the </a:t>
+            </a:r>
+            <a:r>
+              <a:rPr lang="en-US" sz="2400" dirty="0" err="1">
+                <a:solidFill>
+                  <a:schemeClr val="accent2"/>
+                </a:solidFill>
+                <a:latin typeface="Open Sans" pitchFamily="2" charset="0"/>
+                <a:ea typeface="Open Sans" pitchFamily="2" charset="0"/>
+                <a:cs typeface="Open Sans" pitchFamily="2" charset="0"/>
+              </a:rPr>
+              <a:t>get_dummies</a:t>
+            </a:r>
+            <a:r>
+              <a:rPr lang="en-US" sz="2400" dirty="0">
+                <a:solidFill>
+                  <a:schemeClr val="accent2"/>
+                </a:solidFill>
+                <a:latin typeface="Open Sans" pitchFamily="2" charset="0"/>
+                <a:ea typeface="Open Sans" pitchFamily="2" charset="0"/>
+                <a:cs typeface="Open Sans" pitchFamily="2" charset="0"/>
+              </a:rPr>
+              <a:t>() </a:t>
+            </a:r>
+            <a:r>
+              <a:rPr lang="en-US" sz="2400" dirty="0">
+                <a:latin typeface="Open Sans" pitchFamily="2" charset="0"/>
+                <a:ea typeface="Open Sans" pitchFamily="2" charset="0"/>
+                <a:cs typeface="Open Sans" pitchFamily="2" charset="0"/>
+              </a:rPr>
+              <a:t>method used for dummy encoding.</a:t>
+            </a:r>
+          </a:p>
+        </p:txBody>
+      </p:sp>
+      <p:graphicFrame>
+        <p:nvGraphicFramePr>
+          <p:cNvPr id="2" name="Table 1">
+            <a:extLst>
+              <a:ext uri="{FF2B5EF4-FFF2-40B4-BE49-F238E27FC236}">
+                <a16:creationId xmlns:a16="http://schemas.microsoft.com/office/drawing/2014/main" id="{37805389-3315-B3B1-EB86-422739909EC6}"/>
+              </a:ext>
+            </a:extLst>
+          </p:cNvPr>
+          <p:cNvGraphicFramePr>
+            <a:graphicFrameLocks noGrp="1"/>
+          </p:cNvGraphicFramePr>
+          <p:nvPr>
+            <p:extLst>
+              <p:ext uri="{D42A27DB-BD31-4B8C-83A1-F6EECF244321}">
+                <p14:modId xmlns:p14="http://schemas.microsoft.com/office/powerpoint/2010/main" val="1452099036"/>
+              </p:ext>
+            </p:extLst>
+          </p:nvPr>
+        </p:nvGraphicFramePr>
+        <p:xfrm>
+          <a:off x="1597740" y="4447036"/>
+          <a:ext cx="4248422" cy="2008264"/>
+        </p:xfrm>
+        <a:graphic>
+          <a:graphicData uri="http://schemas.openxmlformats.org/drawingml/2006/table">
+            <a:tbl>
+              <a:tblPr firstRow="1" bandRow="1">
+                <a:tableStyleId>{5C22544A-7EE6-4342-B048-85BDC9FD1C3A}</a:tableStyleId>
+              </a:tblPr>
+              <a:tblGrid>
+                <a:gridCol w="1138555">
+                  <a:extLst>
+                    <a:ext uri="{9D8B030D-6E8A-4147-A177-3AD203B41FA5}">
+                      <a16:colId xmlns:a16="http://schemas.microsoft.com/office/drawing/2014/main" val="2937838503"/>
+                    </a:ext>
+                  </a:extLst>
+                </a:gridCol>
+                <a:gridCol w="982980">
+                  <a:extLst>
+                    <a:ext uri="{9D8B030D-6E8A-4147-A177-3AD203B41FA5}">
+                      <a16:colId xmlns:a16="http://schemas.microsoft.com/office/drawing/2014/main" val="3494587557"/>
+                    </a:ext>
+                  </a:extLst>
+                </a:gridCol>
+                <a:gridCol w="982980">
+                  <a:extLst>
+                    <a:ext uri="{9D8B030D-6E8A-4147-A177-3AD203B41FA5}">
+                      <a16:colId xmlns:a16="http://schemas.microsoft.com/office/drawing/2014/main" val="2727339028"/>
+                    </a:ext>
+                  </a:extLst>
+                </a:gridCol>
+                <a:gridCol w="1143907">
+                  <a:extLst>
+                    <a:ext uri="{9D8B030D-6E8A-4147-A177-3AD203B41FA5}">
+                      <a16:colId xmlns:a16="http://schemas.microsoft.com/office/drawing/2014/main" val="1605035232"/>
+                    </a:ext>
+                  </a:extLst>
+                </a:gridCol>
+              </a:tblGrid>
+              <a:tr h="546932">
+                <a:tc>
+                  <a:txBody>
+                    <a:bodyPr/>
+                    <a:lstStyle/>
+                    <a:p>
+                      <a:pPr>
+                        <a:buNone/>
+                      </a:pPr>
+                      <a:r>
+                        <a:rPr lang="en-US" sz="2400" dirty="0">
+                          <a:latin typeface="Open Sans" pitchFamily="2" charset="0"/>
+                          <a:ea typeface="Open Sans" pitchFamily="2" charset="0"/>
+                          <a:cs typeface="Open Sans" pitchFamily="2" charset="0"/>
+                        </a:rPr>
+                        <a:t>Color</a:t>
+                      </a:r>
+                    </a:p>
+                  </a:txBody>
+                  <a:tcPr anchor="ctr"/>
+                </a:tc>
+                <a:tc>
+                  <a:txBody>
+                    <a:bodyPr/>
+                    <a:lstStyle/>
+                    <a:p>
+                      <a:pPr>
+                        <a:buNone/>
+                      </a:pPr>
+                      <a:r>
+                        <a:rPr lang="en-US" sz="2400" dirty="0">
+                          <a:latin typeface="Open Sans" pitchFamily="2" charset="0"/>
+                          <a:ea typeface="Open Sans" pitchFamily="2" charset="0"/>
+                          <a:cs typeface="Open Sans" pitchFamily="2" charset="0"/>
+                        </a:rPr>
+                        <a:t>Red</a:t>
+                      </a:r>
+                    </a:p>
+                  </a:txBody>
+                  <a:tcPr anchor="ctr"/>
+                </a:tc>
+                <a:tc>
+                  <a:txBody>
+                    <a:bodyPr/>
+                    <a:lstStyle/>
+                    <a:p>
+                      <a:pPr>
+                        <a:buNone/>
+                      </a:pPr>
+                      <a:r>
+                        <a:rPr lang="en-US" sz="2400">
+                          <a:latin typeface="Open Sans" pitchFamily="2" charset="0"/>
+                          <a:ea typeface="Open Sans" pitchFamily="2" charset="0"/>
+                          <a:cs typeface="Open Sans" pitchFamily="2" charset="0"/>
+                        </a:rPr>
+                        <a:t>Blue</a:t>
+                      </a:r>
+                    </a:p>
+                  </a:txBody>
+                  <a:tcPr anchor="ctr"/>
+                </a:tc>
+                <a:tc>
+                  <a:txBody>
+                    <a:bodyPr/>
+                    <a:lstStyle/>
+                    <a:p>
+                      <a:pPr>
+                        <a:buNone/>
+                      </a:pPr>
+                      <a:r>
+                        <a:rPr lang="en-US" sz="2400">
+                          <a:latin typeface="Open Sans" pitchFamily="2" charset="0"/>
+                          <a:ea typeface="Open Sans" pitchFamily="2" charset="0"/>
+                          <a:cs typeface="Open Sans" pitchFamily="2" charset="0"/>
+                        </a:rPr>
+                        <a:t>Green</a:t>
+                      </a:r>
+                    </a:p>
+                  </a:txBody>
+                  <a:tcPr anchor="ctr"/>
+                </a:tc>
+                <a:extLst>
+                  <a:ext uri="{0D108BD9-81ED-4DB2-BD59-A6C34878D82A}">
+                    <a16:rowId xmlns:a16="http://schemas.microsoft.com/office/drawing/2014/main" val="810124842"/>
+                  </a:ext>
+                </a:extLst>
+              </a:tr>
+              <a:tr h="422564">
+                <a:tc>
+                  <a:txBody>
+                    <a:bodyPr/>
+                    <a:lstStyle/>
+                    <a:p>
+                      <a:pPr>
+                        <a:buNone/>
+                      </a:pPr>
+                      <a:r>
+                        <a:rPr lang="en-US" sz="2400" dirty="0">
+                          <a:latin typeface="Open Sans" pitchFamily="2" charset="0"/>
+                          <a:ea typeface="Open Sans" pitchFamily="2" charset="0"/>
+                          <a:cs typeface="Open Sans" pitchFamily="2" charset="0"/>
+                        </a:rPr>
+                        <a:t>Red</a:t>
+                      </a:r>
+                    </a:p>
+                  </a:txBody>
+                  <a:tcPr anchor="ctr"/>
+                </a:tc>
+                <a:tc>
+                  <a:txBody>
+                    <a:bodyPr/>
+                    <a:lstStyle/>
+                    <a:p>
+                      <a:pPr>
+                        <a:buNone/>
+                      </a:pPr>
+                      <a:r>
+                        <a:rPr lang="en-US" sz="2400" dirty="0">
+                          <a:latin typeface="Open Sans" pitchFamily="2" charset="0"/>
+                          <a:ea typeface="Open Sans" pitchFamily="2" charset="0"/>
+                          <a:cs typeface="Open Sans" pitchFamily="2" charset="0"/>
+                        </a:rPr>
+                        <a:t>True</a:t>
+                      </a:r>
+                    </a:p>
+                  </a:txBody>
+                  <a:tcPr anchor="ctr"/>
+                </a:tc>
+                <a:tc>
+                  <a:txBody>
+                    <a:bodyPr/>
+                    <a:lstStyle/>
+                    <a:p>
+                      <a:pPr>
+                        <a:buNone/>
+                      </a:pPr>
+                      <a:r>
+                        <a:rPr lang="en-US" sz="2400" dirty="0">
+                          <a:latin typeface="Open Sans" pitchFamily="2" charset="0"/>
+                          <a:ea typeface="Open Sans" pitchFamily="2" charset="0"/>
+                          <a:cs typeface="Open Sans" pitchFamily="2" charset="0"/>
+                        </a:rPr>
+                        <a:t>False</a:t>
+                      </a:r>
+                    </a:p>
+                  </a:txBody>
+                  <a:tcPr anchor="ctr"/>
+                </a:tc>
+                <a:tc>
+                  <a:txBody>
+                    <a:bodyPr/>
+                    <a:lstStyle/>
+                    <a:p>
+                      <a:pPr marL="0" marR="0" lvl="0" indent="0" algn="l" defTabSz="914400" rtl="0" eaLnBrk="1" fontAlgn="auto" latinLnBrk="0" hangingPunct="1">
+                        <a:lnSpc>
+                          <a:spcPct val="100000"/>
+                        </a:lnSpc>
+                        <a:spcBef>
+                          <a:spcPts val="0"/>
+                        </a:spcBef>
+                        <a:spcAft>
+                          <a:spcPts val="0"/>
+                        </a:spcAft>
+                        <a:buClrTx/>
+                        <a:buSzTx/>
+                        <a:buFontTx/>
+                        <a:buNone/>
+                        <a:tabLst/>
+                        <a:defRPr/>
+                      </a:pPr>
+                      <a:r>
+                        <a:rPr lang="en-US" sz="2400" dirty="0">
+                          <a:latin typeface="Open Sans" pitchFamily="2" charset="0"/>
+                          <a:ea typeface="Open Sans" pitchFamily="2" charset="0"/>
+                          <a:cs typeface="Open Sans" pitchFamily="2" charset="0"/>
+                        </a:rPr>
+                        <a:t>False</a:t>
+                      </a:r>
+                    </a:p>
+                  </a:txBody>
+                  <a:tcPr anchor="ctr"/>
+                </a:tc>
+                <a:extLst>
+                  <a:ext uri="{0D108BD9-81ED-4DB2-BD59-A6C34878D82A}">
+                    <a16:rowId xmlns:a16="http://schemas.microsoft.com/office/drawing/2014/main" val="4197396398"/>
+                  </a:ext>
+                </a:extLst>
+              </a:tr>
+              <a:tr h="422564">
+                <a:tc>
+                  <a:txBody>
+                    <a:bodyPr/>
+                    <a:lstStyle/>
+                    <a:p>
+                      <a:pPr>
+                        <a:buNone/>
+                      </a:pPr>
+                      <a:r>
+                        <a:rPr lang="en-US" sz="2400" dirty="0">
+                          <a:latin typeface="Open Sans" pitchFamily="2" charset="0"/>
+                          <a:ea typeface="Open Sans" pitchFamily="2" charset="0"/>
+                          <a:cs typeface="Open Sans" pitchFamily="2" charset="0"/>
+                        </a:rPr>
+                        <a:t>Blue</a:t>
+                      </a:r>
+                    </a:p>
+                  </a:txBody>
+                  <a:tcPr anchor="ctr"/>
+                </a:tc>
+                <a:tc>
+                  <a:txBody>
+                    <a:bodyPr/>
+                    <a:lstStyle/>
+                    <a:p>
+                      <a:pPr marL="0" marR="0" lvl="0" indent="0" algn="l" defTabSz="914400" rtl="0" eaLnBrk="1" fontAlgn="auto" latinLnBrk="0" hangingPunct="1">
+                        <a:lnSpc>
+                          <a:spcPct val="100000"/>
+                        </a:lnSpc>
+                        <a:spcBef>
+                          <a:spcPts val="0"/>
+                        </a:spcBef>
+                        <a:spcAft>
+                          <a:spcPts val="0"/>
+                        </a:spcAft>
+                        <a:buClrTx/>
+                        <a:buSzTx/>
+                        <a:buFontTx/>
+                        <a:buNone/>
+                        <a:tabLst/>
+                        <a:defRPr/>
+                      </a:pPr>
+                      <a:r>
+                        <a:rPr lang="en-US" sz="2400" dirty="0">
+                          <a:latin typeface="Open Sans" pitchFamily="2" charset="0"/>
+                          <a:ea typeface="Open Sans" pitchFamily="2" charset="0"/>
+                          <a:cs typeface="Open Sans" pitchFamily="2" charset="0"/>
+                        </a:rPr>
+                        <a:t>False</a:t>
+                      </a:r>
+                    </a:p>
+                  </a:txBody>
+                  <a:tcPr anchor="ctr"/>
+                </a:tc>
+                <a:tc>
+                  <a:txBody>
+                    <a:bodyPr/>
+                    <a:lstStyle/>
+                    <a:p>
+                      <a:pPr>
+                        <a:buNone/>
+                      </a:pPr>
+                      <a:r>
+                        <a:rPr lang="en-US" sz="2400" dirty="0">
+                          <a:latin typeface="Open Sans" pitchFamily="2" charset="0"/>
+                          <a:ea typeface="Open Sans" pitchFamily="2" charset="0"/>
+                          <a:cs typeface="Open Sans" pitchFamily="2" charset="0"/>
+                        </a:rPr>
+                        <a:t>True</a:t>
+                      </a:r>
+                    </a:p>
+                  </a:txBody>
+                  <a:tcPr anchor="ctr"/>
+                </a:tc>
+                <a:tc>
+                  <a:txBody>
+                    <a:bodyPr/>
+                    <a:lstStyle/>
+                    <a:p>
+                      <a:pPr marL="0" marR="0" lvl="0" indent="0" algn="l" defTabSz="914400" rtl="0" eaLnBrk="1" fontAlgn="auto" latinLnBrk="0" hangingPunct="1">
+                        <a:lnSpc>
+                          <a:spcPct val="100000"/>
+                        </a:lnSpc>
+                        <a:spcBef>
+                          <a:spcPts val="0"/>
+                        </a:spcBef>
+                        <a:spcAft>
+                          <a:spcPts val="0"/>
+                        </a:spcAft>
+                        <a:buClrTx/>
+                        <a:buSzTx/>
+                        <a:buFontTx/>
+                        <a:buNone/>
+                        <a:tabLst/>
+                        <a:defRPr/>
+                      </a:pPr>
+                      <a:r>
+                        <a:rPr lang="en-US" sz="2400" dirty="0">
+                          <a:latin typeface="Open Sans" pitchFamily="2" charset="0"/>
+                          <a:ea typeface="Open Sans" pitchFamily="2" charset="0"/>
+                          <a:cs typeface="Open Sans" pitchFamily="2" charset="0"/>
+                        </a:rPr>
+                        <a:t>False</a:t>
+                      </a:r>
+                    </a:p>
+                  </a:txBody>
+                  <a:tcPr anchor="ctr"/>
+                </a:tc>
+                <a:extLst>
+                  <a:ext uri="{0D108BD9-81ED-4DB2-BD59-A6C34878D82A}">
+                    <a16:rowId xmlns:a16="http://schemas.microsoft.com/office/drawing/2014/main" val="1322385307"/>
+                  </a:ext>
+                </a:extLst>
+              </a:tr>
+              <a:tr h="546932">
+                <a:tc>
+                  <a:txBody>
+                    <a:bodyPr/>
+                    <a:lstStyle/>
+                    <a:p>
+                      <a:pPr>
+                        <a:buNone/>
+                      </a:pPr>
+                      <a:r>
+                        <a:rPr lang="en-US" sz="2400" dirty="0">
+                          <a:latin typeface="Open Sans" pitchFamily="2" charset="0"/>
+                          <a:ea typeface="Open Sans" pitchFamily="2" charset="0"/>
+                          <a:cs typeface="Open Sans" pitchFamily="2" charset="0"/>
+                        </a:rPr>
+                        <a:t>Green</a:t>
+                      </a:r>
+                    </a:p>
+                  </a:txBody>
+                  <a:tcPr anchor="ctr"/>
+                </a:tc>
+                <a:tc>
+                  <a:txBody>
+                    <a:bodyPr/>
+                    <a:lstStyle/>
+                    <a:p>
+                      <a:pPr marL="0" marR="0" lvl="0" indent="0" algn="l" defTabSz="914400" rtl="0" eaLnBrk="1" fontAlgn="auto" latinLnBrk="0" hangingPunct="1">
+                        <a:lnSpc>
+                          <a:spcPct val="100000"/>
+                        </a:lnSpc>
+                        <a:spcBef>
+                          <a:spcPts val="0"/>
+                        </a:spcBef>
+                        <a:spcAft>
+                          <a:spcPts val="0"/>
+                        </a:spcAft>
+                        <a:buClrTx/>
+                        <a:buSzTx/>
+                        <a:buFontTx/>
+                        <a:buNone/>
+                        <a:tabLst/>
+                        <a:defRPr/>
+                      </a:pPr>
+                      <a:r>
+                        <a:rPr lang="en-US" sz="2400" dirty="0">
+                          <a:latin typeface="Open Sans" pitchFamily="2" charset="0"/>
+                          <a:ea typeface="Open Sans" pitchFamily="2" charset="0"/>
+                          <a:cs typeface="Open Sans" pitchFamily="2" charset="0"/>
+                        </a:rPr>
+                        <a:t>False</a:t>
+                      </a:r>
+                    </a:p>
+                  </a:txBody>
+                  <a:tcPr anchor="ctr"/>
+                </a:tc>
+                <a:tc>
+                  <a:txBody>
+                    <a:bodyPr/>
+                    <a:lstStyle/>
+                    <a:p>
+                      <a:pPr marL="0" marR="0" lvl="0" indent="0" algn="l" defTabSz="914400" rtl="0" eaLnBrk="1" fontAlgn="auto" latinLnBrk="0" hangingPunct="1">
+                        <a:lnSpc>
+                          <a:spcPct val="100000"/>
+                        </a:lnSpc>
+                        <a:spcBef>
+                          <a:spcPts val="0"/>
+                        </a:spcBef>
+                        <a:spcAft>
+                          <a:spcPts val="0"/>
+                        </a:spcAft>
+                        <a:buClrTx/>
+                        <a:buSzTx/>
+                        <a:buFontTx/>
+                        <a:buNone/>
+                        <a:tabLst/>
+                        <a:defRPr/>
+                      </a:pPr>
+                      <a:r>
+                        <a:rPr lang="en-US" sz="2400" dirty="0">
+                          <a:latin typeface="Open Sans" pitchFamily="2" charset="0"/>
+                          <a:ea typeface="Open Sans" pitchFamily="2" charset="0"/>
+                          <a:cs typeface="Open Sans" pitchFamily="2" charset="0"/>
+                        </a:rPr>
+                        <a:t>False</a:t>
+                      </a:r>
+                    </a:p>
+                  </a:txBody>
+                  <a:tcPr anchor="ctr"/>
+                </a:tc>
+                <a:tc>
+                  <a:txBody>
+                    <a:bodyPr/>
+                    <a:lstStyle/>
+                    <a:p>
+                      <a:pPr>
+                        <a:buNone/>
+                      </a:pPr>
+                      <a:r>
+                        <a:rPr lang="en-US" sz="2400" dirty="0">
+                          <a:latin typeface="Open Sans" pitchFamily="2" charset="0"/>
+                          <a:ea typeface="Open Sans" pitchFamily="2" charset="0"/>
+                          <a:cs typeface="Open Sans" pitchFamily="2" charset="0"/>
+                        </a:rPr>
+                        <a:t>True</a:t>
+                      </a:r>
+                    </a:p>
+                  </a:txBody>
+                  <a:tcPr anchor="ctr"/>
+                </a:tc>
+                <a:extLst>
+                  <a:ext uri="{0D108BD9-81ED-4DB2-BD59-A6C34878D82A}">
+                    <a16:rowId xmlns:a16="http://schemas.microsoft.com/office/drawing/2014/main" val="586114026"/>
+                  </a:ext>
+                </a:extLst>
+              </a:tr>
+            </a:tbl>
+          </a:graphicData>
+        </a:graphic>
+      </p:graphicFrame>
+      <p:graphicFrame>
+        <p:nvGraphicFramePr>
+          <p:cNvPr id="4" name="Table 3">
+            <a:extLst>
+              <a:ext uri="{FF2B5EF4-FFF2-40B4-BE49-F238E27FC236}">
+                <a16:creationId xmlns:a16="http://schemas.microsoft.com/office/drawing/2014/main" id="{143C7F37-4415-A574-6106-A41C4A28CF20}"/>
+              </a:ext>
+            </a:extLst>
+          </p:cNvPr>
+          <p:cNvGraphicFramePr>
+            <a:graphicFrameLocks noGrp="1"/>
+          </p:cNvGraphicFramePr>
+          <p:nvPr>
+            <p:extLst>
+              <p:ext uri="{D42A27DB-BD31-4B8C-83A1-F6EECF244321}">
+                <p14:modId xmlns:p14="http://schemas.microsoft.com/office/powerpoint/2010/main" val="1896209309"/>
+              </p:ext>
+            </p:extLst>
+          </p:nvPr>
+        </p:nvGraphicFramePr>
+        <p:xfrm>
+          <a:off x="6666913" y="4465774"/>
+          <a:ext cx="4248422" cy="2008264"/>
+        </p:xfrm>
+        <a:graphic>
+          <a:graphicData uri="http://schemas.openxmlformats.org/drawingml/2006/table">
+            <a:tbl>
+              <a:tblPr firstRow="1" bandRow="1">
+                <a:tableStyleId>{5C22544A-7EE6-4342-B048-85BDC9FD1C3A}</a:tableStyleId>
+              </a:tblPr>
+              <a:tblGrid>
+                <a:gridCol w="1138555">
+                  <a:extLst>
+                    <a:ext uri="{9D8B030D-6E8A-4147-A177-3AD203B41FA5}">
+                      <a16:colId xmlns:a16="http://schemas.microsoft.com/office/drawing/2014/main" val="2937838503"/>
+                    </a:ext>
+                  </a:extLst>
+                </a:gridCol>
+                <a:gridCol w="982980">
+                  <a:extLst>
+                    <a:ext uri="{9D8B030D-6E8A-4147-A177-3AD203B41FA5}">
+                      <a16:colId xmlns:a16="http://schemas.microsoft.com/office/drawing/2014/main" val="3494587557"/>
+                    </a:ext>
+                  </a:extLst>
+                </a:gridCol>
+                <a:gridCol w="982980">
+                  <a:extLst>
+                    <a:ext uri="{9D8B030D-6E8A-4147-A177-3AD203B41FA5}">
+                      <a16:colId xmlns:a16="http://schemas.microsoft.com/office/drawing/2014/main" val="2727339028"/>
+                    </a:ext>
+                  </a:extLst>
+                </a:gridCol>
+                <a:gridCol w="1143907">
+                  <a:extLst>
+                    <a:ext uri="{9D8B030D-6E8A-4147-A177-3AD203B41FA5}">
+                      <a16:colId xmlns:a16="http://schemas.microsoft.com/office/drawing/2014/main" val="1605035232"/>
+                    </a:ext>
+                  </a:extLst>
+                </a:gridCol>
+              </a:tblGrid>
+              <a:tr h="546932">
+                <a:tc>
+                  <a:txBody>
+                    <a:bodyPr/>
+                    <a:lstStyle/>
+                    <a:p>
+                      <a:pPr>
+                        <a:buNone/>
+                      </a:pPr>
+                      <a:r>
+                        <a:rPr lang="en-US" sz="2400" dirty="0">
+                          <a:latin typeface="Open Sans" pitchFamily="2" charset="0"/>
+                          <a:ea typeface="Open Sans" pitchFamily="2" charset="0"/>
+                          <a:cs typeface="Open Sans" pitchFamily="2" charset="0"/>
+                        </a:rPr>
+                        <a:t>Color</a:t>
+                      </a:r>
+                    </a:p>
+                  </a:txBody>
+                  <a:tcPr anchor="ctr"/>
+                </a:tc>
+                <a:tc>
+                  <a:txBody>
+                    <a:bodyPr/>
+                    <a:lstStyle/>
+                    <a:p>
+                      <a:pPr>
+                        <a:buNone/>
+                      </a:pPr>
+                      <a:r>
+                        <a:rPr lang="en-US" sz="2400">
+                          <a:latin typeface="Open Sans" pitchFamily="2" charset="0"/>
+                          <a:ea typeface="Open Sans" pitchFamily="2" charset="0"/>
+                          <a:cs typeface="Open Sans" pitchFamily="2" charset="0"/>
+                        </a:rPr>
+                        <a:t>Red</a:t>
+                      </a:r>
+                    </a:p>
+                  </a:txBody>
+                  <a:tcPr anchor="ctr"/>
+                </a:tc>
+                <a:tc>
+                  <a:txBody>
+                    <a:bodyPr/>
+                    <a:lstStyle/>
+                    <a:p>
+                      <a:pPr>
+                        <a:buNone/>
+                      </a:pPr>
+                      <a:r>
+                        <a:rPr lang="en-US" sz="2400">
+                          <a:latin typeface="Open Sans" pitchFamily="2" charset="0"/>
+                          <a:ea typeface="Open Sans" pitchFamily="2" charset="0"/>
+                          <a:cs typeface="Open Sans" pitchFamily="2" charset="0"/>
+                        </a:rPr>
+                        <a:t>Blue</a:t>
+                      </a:r>
+                    </a:p>
+                  </a:txBody>
+                  <a:tcPr anchor="ctr"/>
+                </a:tc>
+                <a:tc>
+                  <a:txBody>
+                    <a:bodyPr/>
+                    <a:lstStyle/>
+                    <a:p>
+                      <a:pPr>
+                        <a:buNone/>
+                      </a:pPr>
+                      <a:r>
+                        <a:rPr lang="en-US" sz="2400">
+                          <a:latin typeface="Open Sans" pitchFamily="2" charset="0"/>
+                          <a:ea typeface="Open Sans" pitchFamily="2" charset="0"/>
+                          <a:cs typeface="Open Sans" pitchFamily="2" charset="0"/>
+                        </a:rPr>
+                        <a:t>Green</a:t>
+                      </a:r>
+                    </a:p>
+                  </a:txBody>
+                  <a:tcPr anchor="ctr"/>
+                </a:tc>
+                <a:extLst>
+                  <a:ext uri="{0D108BD9-81ED-4DB2-BD59-A6C34878D82A}">
+                    <a16:rowId xmlns:a16="http://schemas.microsoft.com/office/drawing/2014/main" val="810124842"/>
+                  </a:ext>
+                </a:extLst>
+              </a:tr>
+              <a:tr h="422564">
+                <a:tc>
+                  <a:txBody>
+                    <a:bodyPr/>
+                    <a:lstStyle/>
+                    <a:p>
+                      <a:pPr>
+                        <a:buNone/>
+                      </a:pPr>
+                      <a:r>
+                        <a:rPr lang="en-US" sz="2400" dirty="0">
+                          <a:latin typeface="Open Sans" pitchFamily="2" charset="0"/>
+                          <a:ea typeface="Open Sans" pitchFamily="2" charset="0"/>
+                          <a:cs typeface="Open Sans" pitchFamily="2" charset="0"/>
+                        </a:rPr>
+                        <a:t>Red</a:t>
+                      </a:r>
+                    </a:p>
+                  </a:txBody>
+                  <a:tcPr anchor="ctr"/>
+                </a:tc>
+                <a:tc>
+                  <a:txBody>
+                    <a:bodyPr/>
+                    <a:lstStyle/>
+                    <a:p>
+                      <a:pPr>
+                        <a:buNone/>
+                      </a:pPr>
+                      <a:r>
+                        <a:rPr lang="en-US" sz="2400" dirty="0">
+                          <a:latin typeface="Open Sans" pitchFamily="2" charset="0"/>
+                          <a:ea typeface="Open Sans" pitchFamily="2" charset="0"/>
+                          <a:cs typeface="Open Sans" pitchFamily="2" charset="0"/>
+                        </a:rPr>
+                        <a:t>1</a:t>
+                      </a:r>
+                    </a:p>
+                  </a:txBody>
+                  <a:tcPr anchor="ctr"/>
+                </a:tc>
+                <a:tc>
+                  <a:txBody>
+                    <a:bodyPr/>
+                    <a:lstStyle/>
+                    <a:p>
+                      <a:pPr>
+                        <a:buNone/>
+                      </a:pPr>
+                      <a:r>
+                        <a:rPr lang="en-US" sz="2400" dirty="0">
+                          <a:latin typeface="Open Sans" pitchFamily="2" charset="0"/>
+                          <a:ea typeface="Open Sans" pitchFamily="2" charset="0"/>
+                          <a:cs typeface="Open Sans" pitchFamily="2" charset="0"/>
+                        </a:rPr>
+                        <a:t>0</a:t>
+                      </a:r>
+                    </a:p>
+                  </a:txBody>
+                  <a:tcPr anchor="ctr"/>
+                </a:tc>
+                <a:tc>
+                  <a:txBody>
+                    <a:bodyPr/>
+                    <a:lstStyle/>
+                    <a:p>
+                      <a:pPr marL="0" marR="0" lvl="0" indent="0" algn="l" defTabSz="914400" rtl="0" eaLnBrk="1" fontAlgn="auto" latinLnBrk="0" hangingPunct="1">
+                        <a:lnSpc>
+                          <a:spcPct val="100000"/>
+                        </a:lnSpc>
+                        <a:spcBef>
+                          <a:spcPts val="0"/>
+                        </a:spcBef>
+                        <a:spcAft>
+                          <a:spcPts val="0"/>
+                        </a:spcAft>
+                        <a:buClrTx/>
+                        <a:buSzTx/>
+                        <a:buFontTx/>
+                        <a:buNone/>
+                        <a:tabLst/>
+                        <a:defRPr/>
+                      </a:pPr>
+                      <a:r>
+                        <a:rPr lang="en-US" sz="2400" dirty="0">
+                          <a:latin typeface="Open Sans" pitchFamily="2" charset="0"/>
+                          <a:ea typeface="Open Sans" pitchFamily="2" charset="0"/>
+                          <a:cs typeface="Open Sans" pitchFamily="2" charset="0"/>
+                        </a:rPr>
+                        <a:t>0</a:t>
+                      </a:r>
+                    </a:p>
+                  </a:txBody>
+                  <a:tcPr anchor="ctr"/>
+                </a:tc>
+                <a:extLst>
+                  <a:ext uri="{0D108BD9-81ED-4DB2-BD59-A6C34878D82A}">
+                    <a16:rowId xmlns:a16="http://schemas.microsoft.com/office/drawing/2014/main" val="4197396398"/>
+                  </a:ext>
+                </a:extLst>
+              </a:tr>
+              <a:tr h="422564">
+                <a:tc>
+                  <a:txBody>
+                    <a:bodyPr/>
+                    <a:lstStyle/>
+                    <a:p>
+                      <a:pPr>
+                        <a:buNone/>
+                      </a:pPr>
+                      <a:r>
+                        <a:rPr lang="en-US" sz="2400" dirty="0">
+                          <a:latin typeface="Open Sans" pitchFamily="2" charset="0"/>
+                          <a:ea typeface="Open Sans" pitchFamily="2" charset="0"/>
+                          <a:cs typeface="Open Sans" pitchFamily="2" charset="0"/>
+                        </a:rPr>
+                        <a:t>Blue</a:t>
+                      </a:r>
+                    </a:p>
+                  </a:txBody>
+                  <a:tcPr anchor="ctr"/>
+                </a:tc>
+                <a:tc>
+                  <a:txBody>
+                    <a:bodyPr/>
+                    <a:lstStyle/>
+                    <a:p>
+                      <a:pPr marL="0" marR="0" lvl="0" indent="0" algn="l" defTabSz="914400" rtl="0" eaLnBrk="1" fontAlgn="auto" latinLnBrk="0" hangingPunct="1">
+                        <a:lnSpc>
+                          <a:spcPct val="100000"/>
+                        </a:lnSpc>
+                        <a:spcBef>
+                          <a:spcPts val="0"/>
+                        </a:spcBef>
+                        <a:spcAft>
+                          <a:spcPts val="0"/>
+                        </a:spcAft>
+                        <a:buClrTx/>
+                        <a:buSzTx/>
+                        <a:buFontTx/>
+                        <a:buNone/>
+                        <a:tabLst/>
+                        <a:defRPr/>
+                      </a:pPr>
+                      <a:r>
+                        <a:rPr lang="en-US" sz="2400" dirty="0">
+                          <a:latin typeface="Open Sans" pitchFamily="2" charset="0"/>
+                          <a:ea typeface="Open Sans" pitchFamily="2" charset="0"/>
+                          <a:cs typeface="Open Sans" pitchFamily="2" charset="0"/>
+                        </a:rPr>
+                        <a:t>0</a:t>
+                      </a:r>
+                    </a:p>
+                  </a:txBody>
+                  <a:tcPr anchor="ctr"/>
+                </a:tc>
+                <a:tc>
+                  <a:txBody>
+                    <a:bodyPr/>
+                    <a:lstStyle/>
+                    <a:p>
+                      <a:pPr>
+                        <a:buNone/>
+                      </a:pPr>
+                      <a:r>
+                        <a:rPr lang="en-US" sz="2400" dirty="0">
+                          <a:latin typeface="Open Sans" pitchFamily="2" charset="0"/>
+                          <a:ea typeface="Open Sans" pitchFamily="2" charset="0"/>
+                          <a:cs typeface="Open Sans" pitchFamily="2" charset="0"/>
+                        </a:rPr>
+                        <a:t>1</a:t>
+                      </a:r>
+                    </a:p>
+                  </a:txBody>
+                  <a:tcPr anchor="ctr"/>
+                </a:tc>
+                <a:tc>
+                  <a:txBody>
+                    <a:bodyPr/>
+                    <a:lstStyle/>
+                    <a:p>
+                      <a:pPr marL="0" marR="0" lvl="0" indent="0" algn="l" defTabSz="914400" rtl="0" eaLnBrk="1" fontAlgn="auto" latinLnBrk="0" hangingPunct="1">
+                        <a:lnSpc>
+                          <a:spcPct val="100000"/>
+                        </a:lnSpc>
+                        <a:spcBef>
+                          <a:spcPts val="0"/>
+                        </a:spcBef>
+                        <a:spcAft>
+                          <a:spcPts val="0"/>
+                        </a:spcAft>
+                        <a:buClrTx/>
+                        <a:buSzTx/>
+                        <a:buFontTx/>
+                        <a:buNone/>
+                        <a:tabLst/>
+                        <a:defRPr/>
+                      </a:pPr>
+                      <a:r>
+                        <a:rPr lang="en-US" sz="2400" dirty="0">
+                          <a:latin typeface="Open Sans" pitchFamily="2" charset="0"/>
+                          <a:ea typeface="Open Sans" pitchFamily="2" charset="0"/>
+                          <a:cs typeface="Open Sans" pitchFamily="2" charset="0"/>
+                        </a:rPr>
+                        <a:t>0</a:t>
+                      </a:r>
+                    </a:p>
+                  </a:txBody>
+                  <a:tcPr anchor="ctr"/>
+                </a:tc>
+                <a:extLst>
+                  <a:ext uri="{0D108BD9-81ED-4DB2-BD59-A6C34878D82A}">
+                    <a16:rowId xmlns:a16="http://schemas.microsoft.com/office/drawing/2014/main" val="1322385307"/>
+                  </a:ext>
+                </a:extLst>
+              </a:tr>
+              <a:tr h="546932">
+                <a:tc>
+                  <a:txBody>
+                    <a:bodyPr/>
+                    <a:lstStyle/>
+                    <a:p>
+                      <a:pPr>
+                        <a:buNone/>
+                      </a:pPr>
+                      <a:r>
+                        <a:rPr lang="en-US" sz="2400" dirty="0">
+                          <a:latin typeface="Open Sans" pitchFamily="2" charset="0"/>
+                          <a:ea typeface="Open Sans" pitchFamily="2" charset="0"/>
+                          <a:cs typeface="Open Sans" pitchFamily="2" charset="0"/>
+                        </a:rPr>
+                        <a:t>Green</a:t>
+                      </a:r>
+                    </a:p>
+                  </a:txBody>
+                  <a:tcPr anchor="ctr"/>
+                </a:tc>
+                <a:tc>
+                  <a:txBody>
+                    <a:bodyPr/>
+                    <a:lstStyle/>
+                    <a:p>
+                      <a:pPr marL="0" marR="0" lvl="0" indent="0" algn="l" defTabSz="914400" rtl="0" eaLnBrk="1" fontAlgn="auto" latinLnBrk="0" hangingPunct="1">
+                        <a:lnSpc>
+                          <a:spcPct val="100000"/>
+                        </a:lnSpc>
+                        <a:spcBef>
+                          <a:spcPts val="0"/>
+                        </a:spcBef>
+                        <a:spcAft>
+                          <a:spcPts val="0"/>
+                        </a:spcAft>
+                        <a:buClrTx/>
+                        <a:buSzTx/>
+                        <a:buFontTx/>
+                        <a:buNone/>
+                        <a:tabLst/>
+                        <a:defRPr/>
+                      </a:pPr>
+                      <a:r>
+                        <a:rPr lang="en-US" sz="2400" dirty="0">
+                          <a:latin typeface="Open Sans" pitchFamily="2" charset="0"/>
+                          <a:ea typeface="Open Sans" pitchFamily="2" charset="0"/>
+                          <a:cs typeface="Open Sans" pitchFamily="2" charset="0"/>
+                        </a:rPr>
+                        <a:t>0</a:t>
+                      </a:r>
+                    </a:p>
+                  </a:txBody>
+                  <a:tcPr anchor="ctr"/>
+                </a:tc>
+                <a:tc>
+                  <a:txBody>
+                    <a:bodyPr/>
+                    <a:lstStyle/>
+                    <a:p>
+                      <a:pPr marL="0" marR="0" lvl="0" indent="0" algn="l" defTabSz="914400" rtl="0" eaLnBrk="1" fontAlgn="auto" latinLnBrk="0" hangingPunct="1">
+                        <a:lnSpc>
+                          <a:spcPct val="100000"/>
+                        </a:lnSpc>
+                        <a:spcBef>
+                          <a:spcPts val="0"/>
+                        </a:spcBef>
+                        <a:spcAft>
+                          <a:spcPts val="0"/>
+                        </a:spcAft>
+                        <a:buClrTx/>
+                        <a:buSzTx/>
+                        <a:buFontTx/>
+                        <a:buNone/>
+                        <a:tabLst/>
+                        <a:defRPr/>
+                      </a:pPr>
+                      <a:r>
+                        <a:rPr lang="en-US" sz="2400" dirty="0">
+                          <a:latin typeface="Open Sans" pitchFamily="2" charset="0"/>
+                          <a:ea typeface="Open Sans" pitchFamily="2" charset="0"/>
+                          <a:cs typeface="Open Sans" pitchFamily="2" charset="0"/>
+                        </a:rPr>
+                        <a:t>0</a:t>
+                      </a:r>
+                    </a:p>
+                  </a:txBody>
+                  <a:tcPr anchor="ctr"/>
+                </a:tc>
+                <a:tc>
+                  <a:txBody>
+                    <a:bodyPr/>
+                    <a:lstStyle/>
+                    <a:p>
+                      <a:pPr>
+                        <a:buNone/>
+                      </a:pPr>
+                      <a:r>
+                        <a:rPr lang="en-US" sz="2400" dirty="0">
+                          <a:latin typeface="Open Sans" pitchFamily="2" charset="0"/>
+                          <a:ea typeface="Open Sans" pitchFamily="2" charset="0"/>
+                          <a:cs typeface="Open Sans" pitchFamily="2" charset="0"/>
+                        </a:rPr>
+                        <a:t>1</a:t>
+                      </a:r>
+                    </a:p>
+                  </a:txBody>
+                  <a:tcPr anchor="ctr"/>
+                </a:tc>
+                <a:extLst>
+                  <a:ext uri="{0D108BD9-81ED-4DB2-BD59-A6C34878D82A}">
+                    <a16:rowId xmlns:a16="http://schemas.microsoft.com/office/drawing/2014/main" val="586114026"/>
+                  </a:ext>
+                </a:extLst>
+              </a:tr>
+            </a:tbl>
+          </a:graphicData>
+        </a:graphic>
+      </p:graphicFrame>
+      <p:cxnSp>
+        <p:nvCxnSpPr>
+          <p:cNvPr id="8" name="Straight Arrow Connector 7">
+            <a:extLst>
+              <a:ext uri="{FF2B5EF4-FFF2-40B4-BE49-F238E27FC236}">
+                <a16:creationId xmlns:a16="http://schemas.microsoft.com/office/drawing/2014/main" id="{22259CA8-21DD-C374-FEB9-0E4F2E9BA3C2}"/>
+              </a:ext>
+            </a:extLst>
+          </p:cNvPr>
+          <p:cNvCxnSpPr>
+            <a:endCxn id="4" idx="1"/>
+          </p:cNvCxnSpPr>
+          <p:nvPr/>
+        </p:nvCxnSpPr>
+        <p:spPr>
+          <a:xfrm>
+            <a:off x="5931106" y="5469906"/>
+            <a:ext cx="735807" cy="0"/>
+          </a:xfrm>
+          <a:prstGeom prst="straightConnector1">
+            <a:avLst/>
+          </a:prstGeom>
+          <a:ln w="28575">
+            <a:tailEnd type="triangle"/>
+          </a:ln>
+        </p:spPr>
+        <p:style>
+          <a:lnRef idx="1">
+            <a:schemeClr val="accent1"/>
+          </a:lnRef>
+          <a:fillRef idx="0">
+            <a:schemeClr val="accent1"/>
+          </a:fillRef>
+          <a:effectRef idx="0">
+            <a:schemeClr val="accent1"/>
+          </a:effectRef>
+          <a:fontRef idx="minor">
+            <a:schemeClr val="tx1"/>
+          </a:fontRef>
+        </p:style>
+      </p:cxnSp>
+    </p:spTree>
+    <p:extLst>
+      <p:ext uri="{BB962C8B-B14F-4D97-AF65-F5344CB8AC3E}">
+        <p14:creationId xmlns:p14="http://schemas.microsoft.com/office/powerpoint/2010/main" val="282185449"/>
+      </p:ext>
+    </p:extLst>
+  </p:cSld>
+  <p:clrMapOvr>
+    <a:masterClrMapping/>
+  </p:clrMapOvr>
+</p:sld>
+</file>
+
+<file path=ppt/slides/slide13.xml><?xml version="1.0" encoding="utf-8"?>
+<p:sld xmlns:a="http://schemas.openxmlformats.org/drawingml/2006/main" xmlns:r="http://schemas.openxmlformats.org/officeDocument/2006/relationships" xmlns:p="http://schemas.openxmlformats.org/presentationml/2006/main">
+  <p:cSld>
+    <p:spTree>
+      <p:nvGrpSpPr>
+        <p:cNvPr id="1" name="">
+          <a:extLst>
+            <a:ext uri="{FF2B5EF4-FFF2-40B4-BE49-F238E27FC236}">
+              <a16:creationId xmlns:a16="http://schemas.microsoft.com/office/drawing/2014/main" id="{E92B6FFC-90EE-A76E-103A-EBC57AE35672}"/>
+            </a:ext>
+          </a:extLst>
+        </p:cNvPr>
+        <p:cNvGrpSpPr/>
+        <p:nvPr/>
+      </p:nvGrpSpPr>
+      <p:grpSpPr>
+        <a:xfrm>
+          <a:off x="0" y="0"/>
+          <a:ext cx="0" cy="0"/>
+          <a:chOff x="0" y="0"/>
+          <a:chExt cx="0" cy="0"/>
+        </a:xfrm>
+      </p:grpSpPr>
+      <p:sp>
+        <p:nvSpPr>
+          <p:cNvPr id="5" name="TextBox 4">
+            <a:extLst>
+              <a:ext uri="{FF2B5EF4-FFF2-40B4-BE49-F238E27FC236}">
+                <a16:creationId xmlns:a16="http://schemas.microsoft.com/office/drawing/2014/main" id="{95E9B363-A21B-1ABB-9FFE-ACB9205C9D9F}"/>
+              </a:ext>
+            </a:extLst>
+          </p:cNvPr>
+          <p:cNvSpPr txBox="1"/>
+          <p:nvPr/>
+        </p:nvSpPr>
+        <p:spPr>
+          <a:xfrm>
+            <a:off x="1597742" y="403123"/>
+            <a:ext cx="8996516" cy="646331"/>
+          </a:xfrm>
+          <a:prstGeom prst="rect">
+            <a:avLst/>
+          </a:prstGeom>
+          <a:noFill/>
+        </p:spPr>
+        <p:txBody>
+          <a:bodyPr wrap="square" rtlCol="0">
+            <a:spAutoFit/>
+          </a:bodyPr>
+          <a:lstStyle/>
+          <a:p>
+            <a:pPr algn="ctr"/>
+            <a:r>
+              <a:rPr lang="en-US" sz="3600" dirty="0">
+                <a:latin typeface="Bebas Neue" panose="020B0606020202050201" pitchFamily="34" charset="0"/>
+              </a:rPr>
+              <a:t>Then Why Dummy</a:t>
+            </a:r>
+          </a:p>
+        </p:txBody>
+      </p:sp>
+      <p:sp>
+        <p:nvSpPr>
+          <p:cNvPr id="7" name="TextBox 6">
+            <a:extLst>
+              <a:ext uri="{FF2B5EF4-FFF2-40B4-BE49-F238E27FC236}">
+                <a16:creationId xmlns:a16="http://schemas.microsoft.com/office/drawing/2014/main" id="{1FD09064-60C5-2F7F-421E-CB986227E435}"/>
+              </a:ext>
+            </a:extLst>
+          </p:cNvPr>
+          <p:cNvSpPr txBox="1"/>
+          <p:nvPr/>
+        </p:nvSpPr>
+        <p:spPr>
+          <a:xfrm>
+            <a:off x="1597741" y="1049454"/>
+            <a:ext cx="9105235" cy="2308324"/>
+          </a:xfrm>
+          <a:prstGeom prst="rect">
+            <a:avLst/>
+          </a:prstGeom>
+          <a:noFill/>
+        </p:spPr>
+        <p:txBody>
+          <a:bodyPr wrap="square" rtlCol="0">
+            <a:spAutoFit/>
+          </a:bodyPr>
+          <a:lstStyle/>
+          <a:p>
+            <a:r>
+              <a:rPr lang="en-US" sz="2400" dirty="0">
+                <a:latin typeface="Open Sans" pitchFamily="2" charset="0"/>
+                <a:ea typeface="Open Sans" pitchFamily="2" charset="0"/>
+                <a:cs typeface="Open Sans" pitchFamily="2" charset="0"/>
+              </a:rPr>
+              <a:t>Although the difference between one-hot and dummy variable encoding is slight, it can sometimes be very impactful.</a:t>
+            </a:r>
+          </a:p>
+          <a:p>
+            <a:endParaRPr lang="en-US" sz="2400" dirty="0">
+              <a:latin typeface="Open Sans" pitchFamily="2" charset="0"/>
+              <a:ea typeface="Open Sans" pitchFamily="2" charset="0"/>
+              <a:cs typeface="Open Sans" pitchFamily="2" charset="0"/>
+            </a:endParaRPr>
+          </a:p>
+          <a:p>
+            <a:r>
+              <a:rPr lang="en-US" sz="2400" dirty="0">
+                <a:latin typeface="Open Sans" pitchFamily="2" charset="0"/>
+                <a:ea typeface="Open Sans" pitchFamily="2" charset="0"/>
+                <a:cs typeface="Open Sans" pitchFamily="2" charset="0"/>
+              </a:rPr>
+              <a:t>It can drop one column (first column using </a:t>
+            </a:r>
+            <a:r>
+              <a:rPr lang="en-US" sz="2400" dirty="0" err="1">
+                <a:solidFill>
+                  <a:schemeClr val="accent2"/>
+                </a:solidFill>
+                <a:latin typeface="Open Sans" pitchFamily="2" charset="0"/>
+                <a:ea typeface="Open Sans" pitchFamily="2" charset="0"/>
+                <a:cs typeface="Open Sans" pitchFamily="2" charset="0"/>
+              </a:rPr>
+              <a:t>drop_first</a:t>
+            </a:r>
+            <a:r>
+              <a:rPr lang="en-US" sz="2400" dirty="0">
+                <a:solidFill>
+                  <a:schemeClr val="accent2"/>
+                </a:solidFill>
+                <a:latin typeface="Open Sans" pitchFamily="2" charset="0"/>
+                <a:ea typeface="Open Sans" pitchFamily="2" charset="0"/>
+                <a:cs typeface="Open Sans" pitchFamily="2" charset="0"/>
+              </a:rPr>
+              <a:t>=True</a:t>
+            </a:r>
+            <a:r>
+              <a:rPr lang="en-US" sz="2400" dirty="0">
+                <a:latin typeface="Open Sans" pitchFamily="2" charset="0"/>
+                <a:ea typeface="Open Sans" pitchFamily="2" charset="0"/>
+                <a:cs typeface="Open Sans" pitchFamily="2" charset="0"/>
+              </a:rPr>
+              <a:t> that avoid multicollinearity (a problem in linear regression when columns are too correlated).</a:t>
+            </a:r>
+          </a:p>
+        </p:txBody>
+      </p:sp>
+      <p:graphicFrame>
+        <p:nvGraphicFramePr>
+          <p:cNvPr id="8" name="Table 7">
+            <a:extLst>
+              <a:ext uri="{FF2B5EF4-FFF2-40B4-BE49-F238E27FC236}">
+                <a16:creationId xmlns:a16="http://schemas.microsoft.com/office/drawing/2014/main" id="{BA703DEC-E50E-E764-9293-5DDAA3CC3129}"/>
+              </a:ext>
+            </a:extLst>
+          </p:cNvPr>
+          <p:cNvGraphicFramePr>
+            <a:graphicFrameLocks noGrp="1"/>
+          </p:cNvGraphicFramePr>
+          <p:nvPr>
+            <p:extLst>
+              <p:ext uri="{D42A27DB-BD31-4B8C-83A1-F6EECF244321}">
+                <p14:modId xmlns:p14="http://schemas.microsoft.com/office/powerpoint/2010/main" val="675719813"/>
+              </p:ext>
+            </p:extLst>
+          </p:nvPr>
+        </p:nvGraphicFramePr>
+        <p:xfrm>
+          <a:off x="1705169" y="3429000"/>
+          <a:ext cx="4248422" cy="2008264"/>
+        </p:xfrm>
+        <a:graphic>
+          <a:graphicData uri="http://schemas.openxmlformats.org/drawingml/2006/table">
+            <a:tbl>
+              <a:tblPr firstRow="1" bandRow="1">
+                <a:tableStyleId>{5C22544A-7EE6-4342-B048-85BDC9FD1C3A}</a:tableStyleId>
+              </a:tblPr>
+              <a:tblGrid>
+                <a:gridCol w="1138555">
+                  <a:extLst>
+                    <a:ext uri="{9D8B030D-6E8A-4147-A177-3AD203B41FA5}">
+                      <a16:colId xmlns:a16="http://schemas.microsoft.com/office/drawing/2014/main" val="2937838503"/>
+                    </a:ext>
+                  </a:extLst>
+                </a:gridCol>
+                <a:gridCol w="982980">
+                  <a:extLst>
+                    <a:ext uri="{9D8B030D-6E8A-4147-A177-3AD203B41FA5}">
+                      <a16:colId xmlns:a16="http://schemas.microsoft.com/office/drawing/2014/main" val="3494587557"/>
+                    </a:ext>
+                  </a:extLst>
+                </a:gridCol>
+                <a:gridCol w="982980">
+                  <a:extLst>
+                    <a:ext uri="{9D8B030D-6E8A-4147-A177-3AD203B41FA5}">
+                      <a16:colId xmlns:a16="http://schemas.microsoft.com/office/drawing/2014/main" val="2727339028"/>
+                    </a:ext>
+                  </a:extLst>
+                </a:gridCol>
+                <a:gridCol w="1143907">
+                  <a:extLst>
+                    <a:ext uri="{9D8B030D-6E8A-4147-A177-3AD203B41FA5}">
+                      <a16:colId xmlns:a16="http://schemas.microsoft.com/office/drawing/2014/main" val="1605035232"/>
+                    </a:ext>
+                  </a:extLst>
+                </a:gridCol>
+              </a:tblGrid>
+              <a:tr h="546932">
+                <a:tc>
+                  <a:txBody>
+                    <a:bodyPr/>
+                    <a:lstStyle/>
+                    <a:p>
+                      <a:pPr>
+                        <a:buNone/>
+                      </a:pPr>
+                      <a:r>
+                        <a:rPr lang="en-US" sz="2400" dirty="0">
+                          <a:latin typeface="Open Sans" pitchFamily="2" charset="0"/>
+                          <a:ea typeface="Open Sans" pitchFamily="2" charset="0"/>
+                          <a:cs typeface="Open Sans" pitchFamily="2" charset="0"/>
+                        </a:rPr>
+                        <a:t>Color</a:t>
+                      </a:r>
+                    </a:p>
+                  </a:txBody>
+                  <a:tcPr anchor="ctr"/>
+                </a:tc>
+                <a:tc>
+                  <a:txBody>
+                    <a:bodyPr/>
+                    <a:lstStyle/>
+                    <a:p>
+                      <a:pPr>
+                        <a:buNone/>
+                      </a:pPr>
+                      <a:r>
+                        <a:rPr lang="en-US" sz="2400" dirty="0">
+                          <a:latin typeface="Open Sans" pitchFamily="2" charset="0"/>
+                          <a:ea typeface="Open Sans" pitchFamily="2" charset="0"/>
+                          <a:cs typeface="Open Sans" pitchFamily="2" charset="0"/>
+                        </a:rPr>
+                        <a:t>Red</a:t>
+                      </a:r>
+                    </a:p>
+                  </a:txBody>
+                  <a:tcPr anchor="ctr"/>
+                </a:tc>
+                <a:tc>
+                  <a:txBody>
+                    <a:bodyPr/>
+                    <a:lstStyle/>
+                    <a:p>
+                      <a:pPr>
+                        <a:buNone/>
+                      </a:pPr>
+                      <a:r>
+                        <a:rPr lang="en-US" sz="2400">
+                          <a:latin typeface="Open Sans" pitchFamily="2" charset="0"/>
+                          <a:ea typeface="Open Sans" pitchFamily="2" charset="0"/>
+                          <a:cs typeface="Open Sans" pitchFamily="2" charset="0"/>
+                        </a:rPr>
+                        <a:t>Blue</a:t>
+                      </a:r>
+                    </a:p>
+                  </a:txBody>
+                  <a:tcPr anchor="ctr"/>
+                </a:tc>
+                <a:tc>
+                  <a:txBody>
+                    <a:bodyPr/>
+                    <a:lstStyle/>
+                    <a:p>
+                      <a:pPr>
+                        <a:buNone/>
+                      </a:pPr>
+                      <a:r>
+                        <a:rPr lang="en-US" sz="2400">
+                          <a:latin typeface="Open Sans" pitchFamily="2" charset="0"/>
+                          <a:ea typeface="Open Sans" pitchFamily="2" charset="0"/>
+                          <a:cs typeface="Open Sans" pitchFamily="2" charset="0"/>
+                        </a:rPr>
+                        <a:t>Green</a:t>
+                      </a:r>
+                    </a:p>
+                  </a:txBody>
+                  <a:tcPr anchor="ctr"/>
+                </a:tc>
+                <a:extLst>
+                  <a:ext uri="{0D108BD9-81ED-4DB2-BD59-A6C34878D82A}">
+                    <a16:rowId xmlns:a16="http://schemas.microsoft.com/office/drawing/2014/main" val="810124842"/>
+                  </a:ext>
+                </a:extLst>
+              </a:tr>
+              <a:tr h="422564">
+                <a:tc>
+                  <a:txBody>
+                    <a:bodyPr/>
+                    <a:lstStyle/>
+                    <a:p>
+                      <a:pPr>
+                        <a:buNone/>
+                      </a:pPr>
+                      <a:r>
+                        <a:rPr lang="en-US" sz="2400" dirty="0">
+                          <a:latin typeface="Open Sans" pitchFamily="2" charset="0"/>
+                          <a:ea typeface="Open Sans" pitchFamily="2" charset="0"/>
+                          <a:cs typeface="Open Sans" pitchFamily="2" charset="0"/>
+                        </a:rPr>
+                        <a:t>Red</a:t>
+                      </a:r>
+                    </a:p>
+                  </a:txBody>
+                  <a:tcPr anchor="ctr"/>
+                </a:tc>
+                <a:tc>
+                  <a:txBody>
+                    <a:bodyPr/>
+                    <a:lstStyle/>
+                    <a:p>
+                      <a:pPr>
+                        <a:buNone/>
+                      </a:pPr>
+                      <a:r>
+                        <a:rPr lang="en-US" sz="2400" dirty="0">
+                          <a:latin typeface="Open Sans" pitchFamily="2" charset="0"/>
+                          <a:ea typeface="Open Sans" pitchFamily="2" charset="0"/>
+                          <a:cs typeface="Open Sans" pitchFamily="2" charset="0"/>
+                        </a:rPr>
+                        <a:t>1</a:t>
+                      </a:r>
+                    </a:p>
+                  </a:txBody>
+                  <a:tcPr anchor="ctr"/>
+                </a:tc>
+                <a:tc>
+                  <a:txBody>
+                    <a:bodyPr/>
+                    <a:lstStyle/>
+                    <a:p>
+                      <a:pPr>
+                        <a:buNone/>
+                      </a:pPr>
+                      <a:r>
+                        <a:rPr lang="en-US" sz="2400" dirty="0">
+                          <a:latin typeface="Open Sans" pitchFamily="2" charset="0"/>
+                          <a:ea typeface="Open Sans" pitchFamily="2" charset="0"/>
+                          <a:cs typeface="Open Sans" pitchFamily="2" charset="0"/>
+                        </a:rPr>
+                        <a:t>0</a:t>
+                      </a:r>
+                    </a:p>
+                  </a:txBody>
+                  <a:tcPr anchor="ctr"/>
+                </a:tc>
+                <a:tc>
+                  <a:txBody>
+                    <a:bodyPr/>
+                    <a:lstStyle/>
+                    <a:p>
+                      <a:pPr marL="0" marR="0" lvl="0" indent="0" algn="l" defTabSz="914400" rtl="0" eaLnBrk="1" fontAlgn="auto" latinLnBrk="0" hangingPunct="1">
+                        <a:lnSpc>
+                          <a:spcPct val="100000"/>
+                        </a:lnSpc>
+                        <a:spcBef>
+                          <a:spcPts val="0"/>
+                        </a:spcBef>
+                        <a:spcAft>
+                          <a:spcPts val="0"/>
+                        </a:spcAft>
+                        <a:buClrTx/>
+                        <a:buSzTx/>
+                        <a:buFontTx/>
+                        <a:buNone/>
+                        <a:tabLst/>
+                        <a:defRPr/>
+                      </a:pPr>
+                      <a:r>
+                        <a:rPr lang="en-US" sz="2400" dirty="0">
+                          <a:latin typeface="Open Sans" pitchFamily="2" charset="0"/>
+                          <a:ea typeface="Open Sans" pitchFamily="2" charset="0"/>
+                          <a:cs typeface="Open Sans" pitchFamily="2" charset="0"/>
+                        </a:rPr>
+                        <a:t>0</a:t>
+                      </a:r>
+                    </a:p>
+                  </a:txBody>
+                  <a:tcPr anchor="ctr"/>
+                </a:tc>
+                <a:extLst>
+                  <a:ext uri="{0D108BD9-81ED-4DB2-BD59-A6C34878D82A}">
+                    <a16:rowId xmlns:a16="http://schemas.microsoft.com/office/drawing/2014/main" val="4197396398"/>
+                  </a:ext>
+                </a:extLst>
+              </a:tr>
+              <a:tr h="422564">
+                <a:tc>
+                  <a:txBody>
+                    <a:bodyPr/>
+                    <a:lstStyle/>
+                    <a:p>
+                      <a:pPr>
+                        <a:buNone/>
+                      </a:pPr>
+                      <a:r>
+                        <a:rPr lang="en-US" sz="2400" dirty="0">
+                          <a:latin typeface="Open Sans" pitchFamily="2" charset="0"/>
+                          <a:ea typeface="Open Sans" pitchFamily="2" charset="0"/>
+                          <a:cs typeface="Open Sans" pitchFamily="2" charset="0"/>
+                        </a:rPr>
+                        <a:t>Blue</a:t>
+                      </a:r>
+                    </a:p>
+                  </a:txBody>
+                  <a:tcPr anchor="ctr"/>
+                </a:tc>
+                <a:tc>
+                  <a:txBody>
+                    <a:bodyPr/>
+                    <a:lstStyle/>
+                    <a:p>
+                      <a:pPr marL="0" marR="0" lvl="0" indent="0" algn="l" defTabSz="914400" rtl="0" eaLnBrk="1" fontAlgn="auto" latinLnBrk="0" hangingPunct="1">
+                        <a:lnSpc>
+                          <a:spcPct val="100000"/>
+                        </a:lnSpc>
+                        <a:spcBef>
+                          <a:spcPts val="0"/>
+                        </a:spcBef>
+                        <a:spcAft>
+                          <a:spcPts val="0"/>
+                        </a:spcAft>
+                        <a:buClrTx/>
+                        <a:buSzTx/>
+                        <a:buFontTx/>
+                        <a:buNone/>
+                        <a:tabLst/>
+                        <a:defRPr/>
+                      </a:pPr>
+                      <a:r>
+                        <a:rPr lang="en-US" sz="2400" dirty="0">
+                          <a:latin typeface="Open Sans" pitchFamily="2" charset="0"/>
+                          <a:ea typeface="Open Sans" pitchFamily="2" charset="0"/>
+                          <a:cs typeface="Open Sans" pitchFamily="2" charset="0"/>
+                        </a:rPr>
+                        <a:t>0</a:t>
+                      </a:r>
+                    </a:p>
+                  </a:txBody>
+                  <a:tcPr anchor="ctr"/>
+                </a:tc>
+                <a:tc>
+                  <a:txBody>
+                    <a:bodyPr/>
+                    <a:lstStyle/>
+                    <a:p>
+                      <a:pPr>
+                        <a:buNone/>
+                      </a:pPr>
+                      <a:r>
+                        <a:rPr lang="en-US" sz="2400" dirty="0">
+                          <a:latin typeface="Open Sans" pitchFamily="2" charset="0"/>
+                          <a:ea typeface="Open Sans" pitchFamily="2" charset="0"/>
+                          <a:cs typeface="Open Sans" pitchFamily="2" charset="0"/>
+                        </a:rPr>
+                        <a:t>1</a:t>
+                      </a:r>
+                    </a:p>
+                  </a:txBody>
+                  <a:tcPr anchor="ctr"/>
+                </a:tc>
+                <a:tc>
+                  <a:txBody>
+                    <a:bodyPr/>
+                    <a:lstStyle/>
+                    <a:p>
+                      <a:pPr marL="0" marR="0" lvl="0" indent="0" algn="l" defTabSz="914400" rtl="0" eaLnBrk="1" fontAlgn="auto" latinLnBrk="0" hangingPunct="1">
+                        <a:lnSpc>
+                          <a:spcPct val="100000"/>
+                        </a:lnSpc>
+                        <a:spcBef>
+                          <a:spcPts val="0"/>
+                        </a:spcBef>
+                        <a:spcAft>
+                          <a:spcPts val="0"/>
+                        </a:spcAft>
+                        <a:buClrTx/>
+                        <a:buSzTx/>
+                        <a:buFontTx/>
+                        <a:buNone/>
+                        <a:tabLst/>
+                        <a:defRPr/>
+                      </a:pPr>
+                      <a:r>
+                        <a:rPr lang="en-US" sz="2400" dirty="0">
+                          <a:latin typeface="Open Sans" pitchFamily="2" charset="0"/>
+                          <a:ea typeface="Open Sans" pitchFamily="2" charset="0"/>
+                          <a:cs typeface="Open Sans" pitchFamily="2" charset="0"/>
+                        </a:rPr>
+                        <a:t>0</a:t>
+                      </a:r>
+                    </a:p>
+                  </a:txBody>
+                  <a:tcPr anchor="ctr"/>
+                </a:tc>
+                <a:extLst>
+                  <a:ext uri="{0D108BD9-81ED-4DB2-BD59-A6C34878D82A}">
+                    <a16:rowId xmlns:a16="http://schemas.microsoft.com/office/drawing/2014/main" val="1322385307"/>
+                  </a:ext>
+                </a:extLst>
+              </a:tr>
+              <a:tr h="546932">
+                <a:tc>
+                  <a:txBody>
+                    <a:bodyPr/>
+                    <a:lstStyle/>
+                    <a:p>
+                      <a:pPr>
+                        <a:buNone/>
+                      </a:pPr>
+                      <a:r>
+                        <a:rPr lang="en-US" sz="2400" dirty="0">
+                          <a:latin typeface="Open Sans" pitchFamily="2" charset="0"/>
+                          <a:ea typeface="Open Sans" pitchFamily="2" charset="0"/>
+                          <a:cs typeface="Open Sans" pitchFamily="2" charset="0"/>
+                        </a:rPr>
+                        <a:t>Green</a:t>
+                      </a:r>
+                    </a:p>
+                  </a:txBody>
+                  <a:tcPr anchor="ctr"/>
+                </a:tc>
+                <a:tc>
+                  <a:txBody>
+                    <a:bodyPr/>
+                    <a:lstStyle/>
+                    <a:p>
+                      <a:pPr marL="0" marR="0" lvl="0" indent="0" algn="l" defTabSz="914400" rtl="0" eaLnBrk="1" fontAlgn="auto" latinLnBrk="0" hangingPunct="1">
+                        <a:lnSpc>
+                          <a:spcPct val="100000"/>
+                        </a:lnSpc>
+                        <a:spcBef>
+                          <a:spcPts val="0"/>
+                        </a:spcBef>
+                        <a:spcAft>
+                          <a:spcPts val="0"/>
+                        </a:spcAft>
+                        <a:buClrTx/>
+                        <a:buSzTx/>
+                        <a:buFontTx/>
+                        <a:buNone/>
+                        <a:tabLst/>
+                        <a:defRPr/>
+                      </a:pPr>
+                      <a:r>
+                        <a:rPr lang="en-US" sz="2400" dirty="0">
+                          <a:latin typeface="Open Sans" pitchFamily="2" charset="0"/>
+                          <a:ea typeface="Open Sans" pitchFamily="2" charset="0"/>
+                          <a:cs typeface="Open Sans" pitchFamily="2" charset="0"/>
+                        </a:rPr>
+                        <a:t>0</a:t>
+                      </a:r>
+                    </a:p>
+                  </a:txBody>
+                  <a:tcPr anchor="ctr"/>
+                </a:tc>
+                <a:tc>
+                  <a:txBody>
+                    <a:bodyPr/>
+                    <a:lstStyle/>
+                    <a:p>
+                      <a:pPr marL="0" marR="0" lvl="0" indent="0" algn="l" defTabSz="914400" rtl="0" eaLnBrk="1" fontAlgn="auto" latinLnBrk="0" hangingPunct="1">
+                        <a:lnSpc>
+                          <a:spcPct val="100000"/>
+                        </a:lnSpc>
+                        <a:spcBef>
+                          <a:spcPts val="0"/>
+                        </a:spcBef>
+                        <a:spcAft>
+                          <a:spcPts val="0"/>
+                        </a:spcAft>
+                        <a:buClrTx/>
+                        <a:buSzTx/>
+                        <a:buFontTx/>
+                        <a:buNone/>
+                        <a:tabLst/>
+                        <a:defRPr/>
+                      </a:pPr>
+                      <a:r>
+                        <a:rPr lang="en-US" sz="2400" dirty="0">
+                          <a:latin typeface="Open Sans" pitchFamily="2" charset="0"/>
+                          <a:ea typeface="Open Sans" pitchFamily="2" charset="0"/>
+                          <a:cs typeface="Open Sans" pitchFamily="2" charset="0"/>
+                        </a:rPr>
+                        <a:t>0</a:t>
+                      </a:r>
+                    </a:p>
+                  </a:txBody>
+                  <a:tcPr anchor="ctr"/>
+                </a:tc>
+                <a:tc>
+                  <a:txBody>
+                    <a:bodyPr/>
+                    <a:lstStyle/>
+                    <a:p>
+                      <a:pPr>
+                        <a:buNone/>
+                      </a:pPr>
+                      <a:r>
+                        <a:rPr lang="en-US" sz="2400" dirty="0">
+                          <a:latin typeface="Open Sans" pitchFamily="2" charset="0"/>
+                          <a:ea typeface="Open Sans" pitchFamily="2" charset="0"/>
+                          <a:cs typeface="Open Sans" pitchFamily="2" charset="0"/>
+                        </a:rPr>
+                        <a:t>1</a:t>
+                      </a:r>
+                    </a:p>
+                  </a:txBody>
+                  <a:tcPr anchor="ctr"/>
+                </a:tc>
+                <a:extLst>
+                  <a:ext uri="{0D108BD9-81ED-4DB2-BD59-A6C34878D82A}">
+                    <a16:rowId xmlns:a16="http://schemas.microsoft.com/office/drawing/2014/main" val="586114026"/>
+                  </a:ext>
+                </a:extLst>
+              </a:tr>
+            </a:tbl>
+          </a:graphicData>
+        </a:graphic>
+      </p:graphicFrame>
+      <p:graphicFrame>
+        <p:nvGraphicFramePr>
+          <p:cNvPr id="9" name="Table 8">
+            <a:extLst>
+              <a:ext uri="{FF2B5EF4-FFF2-40B4-BE49-F238E27FC236}">
+                <a16:creationId xmlns:a16="http://schemas.microsoft.com/office/drawing/2014/main" id="{E76166CB-DC77-EAB8-AEA0-393DF2798056}"/>
+              </a:ext>
+            </a:extLst>
+          </p:cNvPr>
+          <p:cNvGraphicFramePr>
+            <a:graphicFrameLocks noGrp="1"/>
+          </p:cNvGraphicFramePr>
+          <p:nvPr>
+            <p:extLst>
+              <p:ext uri="{D42A27DB-BD31-4B8C-83A1-F6EECF244321}">
+                <p14:modId xmlns:p14="http://schemas.microsoft.com/office/powerpoint/2010/main" val="1674880271"/>
+              </p:ext>
+            </p:extLst>
+          </p:nvPr>
+        </p:nvGraphicFramePr>
+        <p:xfrm>
+          <a:off x="6744362" y="3429000"/>
+          <a:ext cx="3265442" cy="2008264"/>
+        </p:xfrm>
+        <a:graphic>
+          <a:graphicData uri="http://schemas.openxmlformats.org/drawingml/2006/table">
+            <a:tbl>
+              <a:tblPr firstRow="1" bandRow="1">
+                <a:tableStyleId>{5C22544A-7EE6-4342-B048-85BDC9FD1C3A}</a:tableStyleId>
+              </a:tblPr>
+              <a:tblGrid>
+                <a:gridCol w="1138555">
+                  <a:extLst>
+                    <a:ext uri="{9D8B030D-6E8A-4147-A177-3AD203B41FA5}">
+                      <a16:colId xmlns:a16="http://schemas.microsoft.com/office/drawing/2014/main" val="2937838503"/>
+                    </a:ext>
+                  </a:extLst>
+                </a:gridCol>
+                <a:gridCol w="982980">
+                  <a:extLst>
+                    <a:ext uri="{9D8B030D-6E8A-4147-A177-3AD203B41FA5}">
+                      <a16:colId xmlns:a16="http://schemas.microsoft.com/office/drawing/2014/main" val="2727339028"/>
+                    </a:ext>
+                  </a:extLst>
+                </a:gridCol>
+                <a:gridCol w="1143907">
+                  <a:extLst>
+                    <a:ext uri="{9D8B030D-6E8A-4147-A177-3AD203B41FA5}">
+                      <a16:colId xmlns:a16="http://schemas.microsoft.com/office/drawing/2014/main" val="1605035232"/>
+                    </a:ext>
+                  </a:extLst>
+                </a:gridCol>
+              </a:tblGrid>
+              <a:tr h="546932">
+                <a:tc>
+                  <a:txBody>
+                    <a:bodyPr/>
+                    <a:lstStyle/>
+                    <a:p>
+                      <a:pPr>
+                        <a:buNone/>
+                      </a:pPr>
+                      <a:r>
+                        <a:rPr lang="en-US" sz="2400" dirty="0">
+                          <a:latin typeface="Open Sans" pitchFamily="2" charset="0"/>
+                          <a:ea typeface="Open Sans" pitchFamily="2" charset="0"/>
+                          <a:cs typeface="Open Sans" pitchFamily="2" charset="0"/>
+                        </a:rPr>
+                        <a:t>Color</a:t>
+                      </a:r>
+                    </a:p>
+                  </a:txBody>
+                  <a:tcPr anchor="ctr"/>
+                </a:tc>
+                <a:tc>
+                  <a:txBody>
+                    <a:bodyPr/>
+                    <a:lstStyle/>
+                    <a:p>
+                      <a:pPr>
+                        <a:buNone/>
+                      </a:pPr>
+                      <a:r>
+                        <a:rPr lang="en-US" sz="2400">
+                          <a:latin typeface="Open Sans" pitchFamily="2" charset="0"/>
+                          <a:ea typeface="Open Sans" pitchFamily="2" charset="0"/>
+                          <a:cs typeface="Open Sans" pitchFamily="2" charset="0"/>
+                        </a:rPr>
+                        <a:t>Blue</a:t>
+                      </a:r>
+                    </a:p>
+                  </a:txBody>
+                  <a:tcPr anchor="ctr"/>
+                </a:tc>
+                <a:tc>
+                  <a:txBody>
+                    <a:bodyPr/>
+                    <a:lstStyle/>
+                    <a:p>
+                      <a:pPr>
+                        <a:buNone/>
+                      </a:pPr>
+                      <a:r>
+                        <a:rPr lang="en-US" sz="2400">
+                          <a:latin typeface="Open Sans" pitchFamily="2" charset="0"/>
+                          <a:ea typeface="Open Sans" pitchFamily="2" charset="0"/>
+                          <a:cs typeface="Open Sans" pitchFamily="2" charset="0"/>
+                        </a:rPr>
+                        <a:t>Green</a:t>
+                      </a:r>
+                    </a:p>
+                  </a:txBody>
+                  <a:tcPr anchor="ctr"/>
+                </a:tc>
+                <a:extLst>
+                  <a:ext uri="{0D108BD9-81ED-4DB2-BD59-A6C34878D82A}">
+                    <a16:rowId xmlns:a16="http://schemas.microsoft.com/office/drawing/2014/main" val="810124842"/>
+                  </a:ext>
+                </a:extLst>
+              </a:tr>
+              <a:tr h="422564">
+                <a:tc>
+                  <a:txBody>
+                    <a:bodyPr/>
+                    <a:lstStyle/>
+                    <a:p>
+                      <a:pPr>
+                        <a:buNone/>
+                      </a:pPr>
+                      <a:r>
+                        <a:rPr lang="en-US" sz="2400" dirty="0">
+                          <a:latin typeface="Open Sans" pitchFamily="2" charset="0"/>
+                          <a:ea typeface="Open Sans" pitchFamily="2" charset="0"/>
+                          <a:cs typeface="Open Sans" pitchFamily="2" charset="0"/>
+                        </a:rPr>
+                        <a:t>Red</a:t>
+                      </a:r>
+                    </a:p>
+                  </a:txBody>
+                  <a:tcPr anchor="ctr"/>
+                </a:tc>
+                <a:tc>
+                  <a:txBody>
+                    <a:bodyPr/>
+                    <a:lstStyle/>
+                    <a:p>
+                      <a:pPr>
+                        <a:buNone/>
+                      </a:pPr>
+                      <a:r>
+                        <a:rPr lang="en-US" sz="2400" dirty="0">
+                          <a:latin typeface="Open Sans" pitchFamily="2" charset="0"/>
+                          <a:ea typeface="Open Sans" pitchFamily="2" charset="0"/>
+                          <a:cs typeface="Open Sans" pitchFamily="2" charset="0"/>
+                        </a:rPr>
+                        <a:t>0</a:t>
+                      </a:r>
+                    </a:p>
+                  </a:txBody>
+                  <a:tcPr anchor="ctr"/>
+                </a:tc>
+                <a:tc>
+                  <a:txBody>
+                    <a:bodyPr/>
+                    <a:lstStyle/>
+                    <a:p>
+                      <a:pPr marL="0" marR="0" lvl="0" indent="0" algn="l" defTabSz="914400" rtl="0" eaLnBrk="1" fontAlgn="auto" latinLnBrk="0" hangingPunct="1">
+                        <a:lnSpc>
+                          <a:spcPct val="100000"/>
+                        </a:lnSpc>
+                        <a:spcBef>
+                          <a:spcPts val="0"/>
+                        </a:spcBef>
+                        <a:spcAft>
+                          <a:spcPts val="0"/>
+                        </a:spcAft>
+                        <a:buClrTx/>
+                        <a:buSzTx/>
+                        <a:buFontTx/>
+                        <a:buNone/>
+                        <a:tabLst/>
+                        <a:defRPr/>
+                      </a:pPr>
+                      <a:r>
+                        <a:rPr lang="en-US" sz="2400" dirty="0">
+                          <a:latin typeface="Open Sans" pitchFamily="2" charset="0"/>
+                          <a:ea typeface="Open Sans" pitchFamily="2" charset="0"/>
+                          <a:cs typeface="Open Sans" pitchFamily="2" charset="0"/>
+                        </a:rPr>
+                        <a:t>0</a:t>
+                      </a:r>
+                    </a:p>
+                  </a:txBody>
+                  <a:tcPr anchor="ctr"/>
+                </a:tc>
+                <a:extLst>
+                  <a:ext uri="{0D108BD9-81ED-4DB2-BD59-A6C34878D82A}">
+                    <a16:rowId xmlns:a16="http://schemas.microsoft.com/office/drawing/2014/main" val="4197396398"/>
+                  </a:ext>
+                </a:extLst>
+              </a:tr>
+              <a:tr h="422564">
+                <a:tc>
+                  <a:txBody>
+                    <a:bodyPr/>
+                    <a:lstStyle/>
+                    <a:p>
+                      <a:pPr>
+                        <a:buNone/>
+                      </a:pPr>
+                      <a:r>
+                        <a:rPr lang="en-US" sz="2400" dirty="0">
+                          <a:latin typeface="Open Sans" pitchFamily="2" charset="0"/>
+                          <a:ea typeface="Open Sans" pitchFamily="2" charset="0"/>
+                          <a:cs typeface="Open Sans" pitchFamily="2" charset="0"/>
+                        </a:rPr>
+                        <a:t>Blue</a:t>
+                      </a:r>
+                    </a:p>
+                  </a:txBody>
+                  <a:tcPr anchor="ctr"/>
+                </a:tc>
+                <a:tc>
+                  <a:txBody>
+                    <a:bodyPr/>
+                    <a:lstStyle/>
+                    <a:p>
+                      <a:pPr>
+                        <a:buNone/>
+                      </a:pPr>
+                      <a:r>
+                        <a:rPr lang="en-US" sz="2400" dirty="0">
+                          <a:latin typeface="Open Sans" pitchFamily="2" charset="0"/>
+                          <a:ea typeface="Open Sans" pitchFamily="2" charset="0"/>
+                          <a:cs typeface="Open Sans" pitchFamily="2" charset="0"/>
+                        </a:rPr>
+                        <a:t>1</a:t>
+                      </a:r>
+                    </a:p>
+                  </a:txBody>
+                  <a:tcPr anchor="ctr"/>
+                </a:tc>
+                <a:tc>
+                  <a:txBody>
+                    <a:bodyPr/>
+                    <a:lstStyle/>
+                    <a:p>
+                      <a:pPr marL="0" marR="0" lvl="0" indent="0" algn="l" defTabSz="914400" rtl="0" eaLnBrk="1" fontAlgn="auto" latinLnBrk="0" hangingPunct="1">
+                        <a:lnSpc>
+                          <a:spcPct val="100000"/>
+                        </a:lnSpc>
+                        <a:spcBef>
+                          <a:spcPts val="0"/>
+                        </a:spcBef>
+                        <a:spcAft>
+                          <a:spcPts val="0"/>
+                        </a:spcAft>
+                        <a:buClrTx/>
+                        <a:buSzTx/>
+                        <a:buFontTx/>
+                        <a:buNone/>
+                        <a:tabLst/>
+                        <a:defRPr/>
+                      </a:pPr>
+                      <a:r>
+                        <a:rPr lang="en-US" sz="2400" dirty="0">
+                          <a:latin typeface="Open Sans" pitchFamily="2" charset="0"/>
+                          <a:ea typeface="Open Sans" pitchFamily="2" charset="0"/>
+                          <a:cs typeface="Open Sans" pitchFamily="2" charset="0"/>
+                        </a:rPr>
+                        <a:t>0</a:t>
+                      </a:r>
+                    </a:p>
+                  </a:txBody>
+                  <a:tcPr anchor="ctr"/>
+                </a:tc>
+                <a:extLst>
+                  <a:ext uri="{0D108BD9-81ED-4DB2-BD59-A6C34878D82A}">
+                    <a16:rowId xmlns:a16="http://schemas.microsoft.com/office/drawing/2014/main" val="1322385307"/>
+                  </a:ext>
+                </a:extLst>
+              </a:tr>
+              <a:tr h="546932">
+                <a:tc>
+                  <a:txBody>
+                    <a:bodyPr/>
+                    <a:lstStyle/>
+                    <a:p>
+                      <a:pPr>
+                        <a:buNone/>
+                      </a:pPr>
+                      <a:r>
+                        <a:rPr lang="en-US" sz="2400" dirty="0">
+                          <a:latin typeface="Open Sans" pitchFamily="2" charset="0"/>
+                          <a:ea typeface="Open Sans" pitchFamily="2" charset="0"/>
+                          <a:cs typeface="Open Sans" pitchFamily="2" charset="0"/>
+                        </a:rPr>
+                        <a:t>Green</a:t>
+                      </a:r>
+                    </a:p>
+                  </a:txBody>
+                  <a:tcPr anchor="ctr"/>
+                </a:tc>
+                <a:tc>
+                  <a:txBody>
+                    <a:bodyPr/>
+                    <a:lstStyle/>
+                    <a:p>
+                      <a:pPr marL="0" marR="0" lvl="0" indent="0" algn="l" defTabSz="914400" rtl="0" eaLnBrk="1" fontAlgn="auto" latinLnBrk="0" hangingPunct="1">
+                        <a:lnSpc>
+                          <a:spcPct val="100000"/>
+                        </a:lnSpc>
+                        <a:spcBef>
+                          <a:spcPts val="0"/>
+                        </a:spcBef>
+                        <a:spcAft>
+                          <a:spcPts val="0"/>
+                        </a:spcAft>
+                        <a:buClrTx/>
+                        <a:buSzTx/>
+                        <a:buFontTx/>
+                        <a:buNone/>
+                        <a:tabLst/>
+                        <a:defRPr/>
+                      </a:pPr>
+                      <a:r>
+                        <a:rPr lang="en-US" sz="2400" dirty="0">
+                          <a:latin typeface="Open Sans" pitchFamily="2" charset="0"/>
+                          <a:ea typeface="Open Sans" pitchFamily="2" charset="0"/>
+                          <a:cs typeface="Open Sans" pitchFamily="2" charset="0"/>
+                        </a:rPr>
+                        <a:t>0</a:t>
+                      </a:r>
+                    </a:p>
+                  </a:txBody>
+                  <a:tcPr anchor="ctr"/>
+                </a:tc>
+                <a:tc>
+                  <a:txBody>
+                    <a:bodyPr/>
+                    <a:lstStyle/>
+                    <a:p>
+                      <a:pPr>
+                        <a:buNone/>
+                      </a:pPr>
+                      <a:r>
+                        <a:rPr lang="en-US" sz="2400" dirty="0">
+                          <a:latin typeface="Open Sans" pitchFamily="2" charset="0"/>
+                          <a:ea typeface="Open Sans" pitchFamily="2" charset="0"/>
+                          <a:cs typeface="Open Sans" pitchFamily="2" charset="0"/>
+                        </a:rPr>
+                        <a:t>1</a:t>
+                      </a:r>
+                    </a:p>
+                  </a:txBody>
+                  <a:tcPr anchor="ctr"/>
+                </a:tc>
+                <a:extLst>
+                  <a:ext uri="{0D108BD9-81ED-4DB2-BD59-A6C34878D82A}">
+                    <a16:rowId xmlns:a16="http://schemas.microsoft.com/office/drawing/2014/main" val="586114026"/>
+                  </a:ext>
+                </a:extLst>
+              </a:tr>
+            </a:tbl>
+          </a:graphicData>
+        </a:graphic>
+      </p:graphicFrame>
+      <p:cxnSp>
+        <p:nvCxnSpPr>
+          <p:cNvPr id="10" name="Straight Arrow Connector 9">
+            <a:extLst>
+              <a:ext uri="{FF2B5EF4-FFF2-40B4-BE49-F238E27FC236}">
+                <a16:creationId xmlns:a16="http://schemas.microsoft.com/office/drawing/2014/main" id="{CB0A6559-2787-BE1D-F1F6-652A1ED29195}"/>
+              </a:ext>
+            </a:extLst>
+          </p:cNvPr>
+          <p:cNvCxnSpPr>
+            <a:cxnSpLocks/>
+            <a:stCxn id="8" idx="3"/>
+            <a:endCxn id="9" idx="1"/>
+          </p:cNvCxnSpPr>
+          <p:nvPr/>
+        </p:nvCxnSpPr>
+        <p:spPr>
+          <a:xfrm>
+            <a:off x="5953591" y="4433132"/>
+            <a:ext cx="790771" cy="0"/>
+          </a:xfrm>
+          <a:prstGeom prst="straightConnector1">
+            <a:avLst/>
+          </a:prstGeom>
+          <a:ln w="28575">
+            <a:tailEnd type="triangle"/>
+          </a:ln>
+        </p:spPr>
+        <p:style>
+          <a:lnRef idx="1">
+            <a:schemeClr val="accent1"/>
+          </a:lnRef>
+          <a:fillRef idx="0">
+            <a:schemeClr val="accent1"/>
+          </a:fillRef>
+          <a:effectRef idx="0">
+            <a:schemeClr val="accent1"/>
+          </a:effectRef>
+          <a:fontRef idx="minor">
+            <a:schemeClr val="tx1"/>
+          </a:fontRef>
+        </p:style>
+      </p:cxnSp>
+    </p:spTree>
+    <p:extLst>
+      <p:ext uri="{BB962C8B-B14F-4D97-AF65-F5344CB8AC3E}">
+        <p14:creationId xmlns:p14="http://schemas.microsoft.com/office/powerpoint/2010/main" val="648183283"/>
+      </p:ext>
+    </p:extLst>
+  </p:cSld>
+  <p:clrMapOvr>
+    <a:masterClrMapping/>
+  </p:clrMapOvr>
+</p:sld>
+</file>
+
+<file path=ppt/slides/slide14.xml><?xml version="1.0" encoding="utf-8"?>
+<p:sld xmlns:a="http://schemas.openxmlformats.org/drawingml/2006/main" xmlns:r="http://schemas.openxmlformats.org/officeDocument/2006/relationships" xmlns:p="http://schemas.openxmlformats.org/presentationml/2006/main">
+  <p:cSld>
+    <p:spTree>
+      <p:nvGrpSpPr>
+        <p:cNvPr id="1" name="">
+          <a:extLst>
+            <a:ext uri="{FF2B5EF4-FFF2-40B4-BE49-F238E27FC236}">
+              <a16:creationId xmlns:a16="http://schemas.microsoft.com/office/drawing/2014/main" id="{01C01B61-F5B8-33AD-43E7-16DF9442AAFD}"/>
+            </a:ext>
+          </a:extLst>
+        </p:cNvPr>
+        <p:cNvGrpSpPr/>
+        <p:nvPr/>
+      </p:nvGrpSpPr>
+      <p:grpSpPr>
+        <a:xfrm>
+          <a:off x="0" y="0"/>
+          <a:ext cx="0" cy="0"/>
+          <a:chOff x="0" y="0"/>
+          <a:chExt cx="0" cy="0"/>
+        </a:xfrm>
+      </p:grpSpPr>
+      <p:sp>
+        <p:nvSpPr>
+          <p:cNvPr id="5" name="TextBox 4">
+            <a:extLst>
+              <a:ext uri="{FF2B5EF4-FFF2-40B4-BE49-F238E27FC236}">
+                <a16:creationId xmlns:a16="http://schemas.microsoft.com/office/drawing/2014/main" id="{62E9683D-3AFC-2F0A-BF92-1E1593B6C582}"/>
+              </a:ext>
+            </a:extLst>
+          </p:cNvPr>
+          <p:cNvSpPr txBox="1"/>
+          <p:nvPr/>
+        </p:nvSpPr>
+        <p:spPr>
+          <a:xfrm>
+            <a:off x="1597742" y="403123"/>
+            <a:ext cx="8996516" cy="646331"/>
+          </a:xfrm>
+          <a:prstGeom prst="rect">
+            <a:avLst/>
+          </a:prstGeom>
+          <a:noFill/>
+        </p:spPr>
+        <p:txBody>
+          <a:bodyPr wrap="square" rtlCol="0">
+            <a:spAutoFit/>
+          </a:bodyPr>
+          <a:lstStyle/>
+          <a:p>
+            <a:pPr algn="ctr"/>
+            <a:r>
+              <a:rPr lang="en-US" sz="3600" dirty="0">
+                <a:latin typeface="Bebas Neue" panose="020B0606020202050201" pitchFamily="34" charset="0"/>
+              </a:rPr>
+              <a:t>What is Multicollinearity</a:t>
+            </a:r>
+          </a:p>
+        </p:txBody>
+      </p:sp>
+      <p:sp>
+        <p:nvSpPr>
+          <p:cNvPr id="7" name="TextBox 6">
+            <a:extLst>
+              <a:ext uri="{FF2B5EF4-FFF2-40B4-BE49-F238E27FC236}">
+                <a16:creationId xmlns:a16="http://schemas.microsoft.com/office/drawing/2014/main" id="{52C191FE-EF3E-5FD9-9337-06DBC26FA8BF}"/>
+              </a:ext>
+            </a:extLst>
+          </p:cNvPr>
+          <p:cNvSpPr txBox="1"/>
+          <p:nvPr/>
+        </p:nvSpPr>
+        <p:spPr>
+          <a:xfrm>
+            <a:off x="1597742" y="1049454"/>
+            <a:ext cx="8996516" cy="461665"/>
+          </a:xfrm>
+          <a:prstGeom prst="rect">
+            <a:avLst/>
+          </a:prstGeom>
+          <a:noFill/>
+        </p:spPr>
+        <p:txBody>
+          <a:bodyPr wrap="square" rtlCol="0">
+            <a:spAutoFit/>
+          </a:bodyPr>
+          <a:lstStyle/>
+          <a:p>
+            <a:pPr algn="just" fontAlgn="base"/>
+            <a:r>
+              <a:rPr lang="en-US" sz="2400" dirty="0">
+                <a:latin typeface="Open Sans" pitchFamily="2" charset="0"/>
+                <a:ea typeface="Open Sans" pitchFamily="2" charset="0"/>
+                <a:cs typeface="Open Sans" pitchFamily="2" charset="0"/>
+              </a:rPr>
+              <a:t>Body</a:t>
+            </a:r>
+          </a:p>
+        </p:txBody>
+      </p:sp>
+    </p:spTree>
+    <p:extLst>
+      <p:ext uri="{BB962C8B-B14F-4D97-AF65-F5344CB8AC3E}">
+        <p14:creationId xmlns:p14="http://schemas.microsoft.com/office/powerpoint/2010/main" val="3256429674"/>
+      </p:ext>
+    </p:extLst>
+  </p:cSld>
+  <p:clrMapOvr>
+    <a:masterClrMapping/>
+  </p:clrMapOvr>
+</p:sld>
+</file>
+
+<file path=ppt/slides/slide15.xml><?xml version="1.0" encoding="utf-8"?>
+<p:sld xmlns:a="http://schemas.openxmlformats.org/drawingml/2006/main" xmlns:r="http://schemas.openxmlformats.org/officeDocument/2006/relationships" xmlns:p="http://schemas.openxmlformats.org/presentationml/2006/main">
+  <p:cSld>
+    <p:spTree>
+      <p:nvGrpSpPr>
+        <p:cNvPr id="1" name="">
+          <a:extLst>
+            <a:ext uri="{FF2B5EF4-FFF2-40B4-BE49-F238E27FC236}">
+              <a16:creationId xmlns:a16="http://schemas.microsoft.com/office/drawing/2014/main" id="{E7ADD82C-6B59-22C0-F9DC-27034BAD67E7}"/>
+            </a:ext>
+          </a:extLst>
+        </p:cNvPr>
+        <p:cNvGrpSpPr/>
+        <p:nvPr/>
+      </p:nvGrpSpPr>
+      <p:grpSpPr>
+        <a:xfrm>
+          <a:off x="0" y="0"/>
+          <a:ext cx="0" cy="0"/>
+          <a:chOff x="0" y="0"/>
+          <a:chExt cx="0" cy="0"/>
+        </a:xfrm>
+      </p:grpSpPr>
+      <p:sp>
+        <p:nvSpPr>
+          <p:cNvPr id="5" name="TextBox 4">
+            <a:extLst>
+              <a:ext uri="{FF2B5EF4-FFF2-40B4-BE49-F238E27FC236}">
+                <a16:creationId xmlns:a16="http://schemas.microsoft.com/office/drawing/2014/main" id="{238EBA27-E672-41B1-17B8-77DDFDD84946}"/>
+              </a:ext>
+            </a:extLst>
+          </p:cNvPr>
+          <p:cNvSpPr txBox="1"/>
+          <p:nvPr/>
+        </p:nvSpPr>
+        <p:spPr>
+          <a:xfrm>
+            <a:off x="1597742" y="403123"/>
+            <a:ext cx="8996516" cy="1200329"/>
+          </a:xfrm>
+          <a:prstGeom prst="rect">
+            <a:avLst/>
+          </a:prstGeom>
+          <a:noFill/>
+        </p:spPr>
+        <p:txBody>
+          <a:bodyPr wrap="square" rtlCol="0">
+            <a:spAutoFit/>
+          </a:bodyPr>
+          <a:lstStyle/>
+          <a:p>
+            <a:pPr algn="ctr"/>
+            <a:r>
+              <a:rPr lang="en-US" sz="3600" dirty="0">
+                <a:latin typeface="Bebas Neue" panose="020B0606020202050201" pitchFamily="34" charset="0"/>
+              </a:rPr>
+              <a:t>difference is between one-hot Encoding and dummy variable Encoding</a:t>
+            </a:r>
+          </a:p>
+        </p:txBody>
+      </p:sp>
+      <p:graphicFrame>
+        <p:nvGraphicFramePr>
+          <p:cNvPr id="2" name="Table 1">
+            <a:extLst>
+              <a:ext uri="{FF2B5EF4-FFF2-40B4-BE49-F238E27FC236}">
+                <a16:creationId xmlns:a16="http://schemas.microsoft.com/office/drawing/2014/main" id="{22DFAB6E-F337-FF77-92F1-8182DAA9FBB3}"/>
+              </a:ext>
+            </a:extLst>
+          </p:cNvPr>
+          <p:cNvGraphicFramePr>
+            <a:graphicFrameLocks noGrp="1"/>
+          </p:cNvGraphicFramePr>
+          <p:nvPr/>
+        </p:nvGraphicFramePr>
+        <p:xfrm>
+          <a:off x="1597742" y="1603452"/>
+          <a:ext cx="9479989" cy="3383280"/>
+        </p:xfrm>
+        <a:graphic>
+          <a:graphicData uri="http://schemas.openxmlformats.org/drawingml/2006/table">
+            <a:tbl>
+              <a:tblPr firstRow="1" bandRow="1">
+                <a:tableStyleId>{5C22544A-7EE6-4342-B048-85BDC9FD1C3A}</a:tableStyleId>
+              </a:tblPr>
+              <a:tblGrid>
+                <a:gridCol w="3280958">
+                  <a:extLst>
+                    <a:ext uri="{9D8B030D-6E8A-4147-A177-3AD203B41FA5}">
+                      <a16:colId xmlns:a16="http://schemas.microsoft.com/office/drawing/2014/main" val="3383239388"/>
+                    </a:ext>
+                  </a:extLst>
+                </a:gridCol>
+                <a:gridCol w="2301589">
+                  <a:extLst>
+                    <a:ext uri="{9D8B030D-6E8A-4147-A177-3AD203B41FA5}">
+                      <a16:colId xmlns:a16="http://schemas.microsoft.com/office/drawing/2014/main" val="4075979967"/>
+                    </a:ext>
+                  </a:extLst>
+                </a:gridCol>
+                <a:gridCol w="3897442">
+                  <a:extLst>
+                    <a:ext uri="{9D8B030D-6E8A-4147-A177-3AD203B41FA5}">
+                      <a16:colId xmlns:a16="http://schemas.microsoft.com/office/drawing/2014/main" val="845227469"/>
+                    </a:ext>
+                  </a:extLst>
+                </a:gridCol>
+              </a:tblGrid>
+              <a:tr h="370840">
+                <a:tc>
+                  <a:txBody>
+                    <a:bodyPr/>
+                    <a:lstStyle/>
+                    <a:p>
+                      <a:pPr>
+                        <a:buNone/>
+                      </a:pPr>
+                      <a:r>
+                        <a:rPr lang="en-US" sz="2400" dirty="0">
+                          <a:latin typeface="Open Sans" pitchFamily="2" charset="0"/>
+                          <a:ea typeface="Open Sans" pitchFamily="2" charset="0"/>
+                          <a:cs typeface="Open Sans" pitchFamily="2" charset="0"/>
+                        </a:rPr>
+                        <a:t>Feature</a:t>
+                      </a:r>
+                    </a:p>
+                  </a:txBody>
+                  <a:tcPr anchor="ctr"/>
+                </a:tc>
+                <a:tc>
+                  <a:txBody>
+                    <a:bodyPr/>
+                    <a:lstStyle/>
+                    <a:p>
+                      <a:pPr>
+                        <a:buNone/>
+                      </a:pPr>
+                      <a:r>
+                        <a:rPr lang="en-US" sz="2400" b="1">
+                          <a:latin typeface="Open Sans" pitchFamily="2" charset="0"/>
+                          <a:ea typeface="Open Sans" pitchFamily="2" charset="0"/>
+                          <a:cs typeface="Open Sans" pitchFamily="2" charset="0"/>
+                        </a:rPr>
+                        <a:t>One-Hot Encoding</a:t>
+                      </a:r>
+                      <a:endParaRPr lang="en-US" sz="2400">
+                        <a:latin typeface="Open Sans" pitchFamily="2" charset="0"/>
+                        <a:ea typeface="Open Sans" pitchFamily="2" charset="0"/>
+                        <a:cs typeface="Open Sans" pitchFamily="2" charset="0"/>
+                      </a:endParaRPr>
+                    </a:p>
+                  </a:txBody>
+                  <a:tcPr anchor="ctr"/>
+                </a:tc>
+                <a:tc>
+                  <a:txBody>
+                    <a:bodyPr/>
+                    <a:lstStyle/>
+                    <a:p>
+                      <a:pPr>
+                        <a:buNone/>
+                      </a:pPr>
+                      <a:r>
+                        <a:rPr lang="en-US" sz="2400" b="1">
+                          <a:latin typeface="Open Sans" pitchFamily="2" charset="0"/>
+                          <a:ea typeface="Open Sans" pitchFamily="2" charset="0"/>
+                          <a:cs typeface="Open Sans" pitchFamily="2" charset="0"/>
+                        </a:rPr>
+                        <a:t>Dummy Variable Encoding</a:t>
+                      </a:r>
+                      <a:endParaRPr lang="en-US" sz="2400">
+                        <a:latin typeface="Open Sans" pitchFamily="2" charset="0"/>
+                        <a:ea typeface="Open Sans" pitchFamily="2" charset="0"/>
+                        <a:cs typeface="Open Sans" pitchFamily="2" charset="0"/>
+                      </a:endParaRPr>
+                    </a:p>
+                  </a:txBody>
+                  <a:tcPr anchor="ctr"/>
+                </a:tc>
+                <a:extLst>
+                  <a:ext uri="{0D108BD9-81ED-4DB2-BD59-A6C34878D82A}">
+                    <a16:rowId xmlns:a16="http://schemas.microsoft.com/office/drawing/2014/main" val="2844821788"/>
+                  </a:ext>
+                </a:extLst>
+              </a:tr>
+              <a:tr h="370840">
+                <a:tc>
+                  <a:txBody>
+                    <a:bodyPr/>
+                    <a:lstStyle/>
+                    <a:p>
+                      <a:pPr>
+                        <a:buNone/>
+                      </a:pPr>
+                      <a:r>
+                        <a:rPr lang="en-US" sz="2400">
+                          <a:latin typeface="Open Sans" pitchFamily="2" charset="0"/>
+                          <a:ea typeface="Open Sans" pitchFamily="2" charset="0"/>
+                          <a:cs typeface="Open Sans" pitchFamily="2" charset="0"/>
+                        </a:rPr>
+                        <a:t>Keeps all categories</a:t>
+                      </a:r>
+                    </a:p>
+                  </a:txBody>
+                  <a:tcPr anchor="ctr"/>
+                </a:tc>
+                <a:tc>
+                  <a:txBody>
+                    <a:bodyPr/>
+                    <a:lstStyle/>
+                    <a:p>
+                      <a:pPr>
+                        <a:buNone/>
+                      </a:pPr>
+                      <a:r>
+                        <a:rPr lang="en-US" sz="2400">
+                          <a:latin typeface="Open Sans" pitchFamily="2" charset="0"/>
+                          <a:ea typeface="Open Sans" pitchFamily="2" charset="0"/>
+                          <a:cs typeface="Open Sans" pitchFamily="2" charset="0"/>
+                        </a:rPr>
+                        <a:t>✅ Yes</a:t>
+                      </a:r>
+                    </a:p>
+                  </a:txBody>
+                  <a:tcPr anchor="ctr"/>
+                </a:tc>
+                <a:tc>
+                  <a:txBody>
+                    <a:bodyPr/>
+                    <a:lstStyle/>
+                    <a:p>
+                      <a:pPr>
+                        <a:buNone/>
+                      </a:pPr>
+                      <a:r>
+                        <a:rPr lang="en-US" sz="2400">
+                          <a:latin typeface="Open Sans" pitchFamily="2" charset="0"/>
+                          <a:ea typeface="Open Sans" pitchFamily="2" charset="0"/>
+                          <a:cs typeface="Open Sans" pitchFamily="2" charset="0"/>
+                        </a:rPr>
+                        <a:t>❌ Drops one</a:t>
+                      </a:r>
+                    </a:p>
+                  </a:txBody>
+                  <a:tcPr anchor="ctr"/>
+                </a:tc>
+                <a:extLst>
+                  <a:ext uri="{0D108BD9-81ED-4DB2-BD59-A6C34878D82A}">
+                    <a16:rowId xmlns:a16="http://schemas.microsoft.com/office/drawing/2014/main" val="1388467814"/>
+                  </a:ext>
+                </a:extLst>
+              </a:tr>
+              <a:tr h="370840">
+                <a:tc>
+                  <a:txBody>
+                    <a:bodyPr/>
+                    <a:lstStyle/>
+                    <a:p>
+                      <a:pPr>
+                        <a:buNone/>
+                      </a:pPr>
+                      <a:r>
+                        <a:rPr lang="en-US" sz="2400" dirty="0">
+                          <a:latin typeface="Open Sans" pitchFamily="2" charset="0"/>
+                          <a:ea typeface="Open Sans" pitchFamily="2" charset="0"/>
+                          <a:cs typeface="Open Sans" pitchFamily="2" charset="0"/>
+                        </a:rPr>
+                        <a:t>Used in</a:t>
+                      </a:r>
+                    </a:p>
+                  </a:txBody>
+                  <a:tcPr anchor="ctr"/>
+                </a:tc>
+                <a:tc>
+                  <a:txBody>
+                    <a:bodyPr/>
+                    <a:lstStyle/>
+                    <a:p>
+                      <a:pPr>
+                        <a:buNone/>
+                      </a:pPr>
+                      <a:r>
+                        <a:rPr lang="en-US" sz="2400">
+                          <a:latin typeface="Open Sans" pitchFamily="2" charset="0"/>
+                          <a:ea typeface="Open Sans" pitchFamily="2" charset="0"/>
+                          <a:cs typeface="Open Sans" pitchFamily="2" charset="0"/>
+                        </a:rPr>
+                        <a:t>ML models</a:t>
+                      </a:r>
+                    </a:p>
+                  </a:txBody>
+                  <a:tcPr anchor="ctr"/>
+                </a:tc>
+                <a:tc>
+                  <a:txBody>
+                    <a:bodyPr/>
+                    <a:lstStyle/>
+                    <a:p>
+                      <a:pPr>
+                        <a:buNone/>
+                      </a:pPr>
+                      <a:r>
+                        <a:rPr lang="en-US" sz="2400">
+                          <a:latin typeface="Open Sans" pitchFamily="2" charset="0"/>
+                          <a:ea typeface="Open Sans" pitchFamily="2" charset="0"/>
+                          <a:cs typeface="Open Sans" pitchFamily="2" charset="0"/>
+                        </a:rPr>
+                        <a:t>Statistical models (like regression)</a:t>
+                      </a:r>
+                    </a:p>
+                  </a:txBody>
+                  <a:tcPr anchor="ctr"/>
+                </a:tc>
+                <a:extLst>
+                  <a:ext uri="{0D108BD9-81ED-4DB2-BD59-A6C34878D82A}">
+                    <a16:rowId xmlns:a16="http://schemas.microsoft.com/office/drawing/2014/main" val="2726751740"/>
+                  </a:ext>
+                </a:extLst>
+              </a:tr>
+              <a:tr h="370840">
+                <a:tc>
+                  <a:txBody>
+                    <a:bodyPr/>
+                    <a:lstStyle/>
+                    <a:p>
+                      <a:pPr>
+                        <a:buNone/>
+                      </a:pPr>
+                      <a:r>
+                        <a:rPr lang="en-US" sz="2400" dirty="0">
+                          <a:latin typeface="Open Sans" pitchFamily="2" charset="0"/>
+                          <a:ea typeface="Open Sans" pitchFamily="2" charset="0"/>
+                          <a:cs typeface="Open Sans" pitchFamily="2" charset="0"/>
+                        </a:rPr>
+                        <a:t>Prevents multicollinearity</a:t>
+                      </a:r>
+                    </a:p>
+                  </a:txBody>
+                  <a:tcPr anchor="ctr"/>
+                </a:tc>
+                <a:tc>
+                  <a:txBody>
+                    <a:bodyPr/>
+                    <a:lstStyle/>
+                    <a:p>
+                      <a:pPr>
+                        <a:buNone/>
+                      </a:pPr>
+                      <a:r>
+                        <a:rPr lang="en-US" sz="2400">
+                          <a:latin typeface="Open Sans" pitchFamily="2" charset="0"/>
+                          <a:ea typeface="Open Sans" pitchFamily="2" charset="0"/>
+                          <a:cs typeface="Open Sans" pitchFamily="2" charset="0"/>
+                        </a:rPr>
+                        <a:t>❌ No</a:t>
+                      </a:r>
+                    </a:p>
+                  </a:txBody>
+                  <a:tcPr anchor="ctr"/>
+                </a:tc>
+                <a:tc>
+                  <a:txBody>
+                    <a:bodyPr/>
+                    <a:lstStyle/>
+                    <a:p>
+                      <a:pPr>
+                        <a:buNone/>
+                      </a:pPr>
+                      <a:r>
+                        <a:rPr lang="en-US" sz="2400">
+                          <a:latin typeface="Open Sans" pitchFamily="2" charset="0"/>
+                          <a:ea typeface="Open Sans" pitchFamily="2" charset="0"/>
+                          <a:cs typeface="Open Sans" pitchFamily="2" charset="0"/>
+                        </a:rPr>
+                        <a:t>✅ Yes</a:t>
+                      </a:r>
+                    </a:p>
+                  </a:txBody>
+                  <a:tcPr anchor="ctr"/>
+                </a:tc>
+                <a:extLst>
+                  <a:ext uri="{0D108BD9-81ED-4DB2-BD59-A6C34878D82A}">
+                    <a16:rowId xmlns:a16="http://schemas.microsoft.com/office/drawing/2014/main" val="3319533895"/>
+                  </a:ext>
+                </a:extLst>
+              </a:tr>
+              <a:tr h="370840">
+                <a:tc>
+                  <a:txBody>
+                    <a:bodyPr/>
+                    <a:lstStyle/>
+                    <a:p>
+                      <a:pPr>
+                        <a:buNone/>
+                      </a:pPr>
+                      <a:r>
+                        <a:rPr lang="en-US" sz="2400">
+                          <a:latin typeface="Open Sans" pitchFamily="2" charset="0"/>
+                          <a:ea typeface="Open Sans" pitchFamily="2" charset="0"/>
+                          <a:cs typeface="Open Sans" pitchFamily="2" charset="0"/>
+                        </a:rPr>
+                        <a:t>Example (3 colors)</a:t>
+                      </a:r>
+                    </a:p>
+                  </a:txBody>
+                  <a:tcPr anchor="ctr"/>
+                </a:tc>
+                <a:tc>
+                  <a:txBody>
+                    <a:bodyPr/>
+                    <a:lstStyle/>
+                    <a:p>
+                      <a:pPr>
+                        <a:buNone/>
+                      </a:pPr>
+                      <a:r>
+                        <a:rPr lang="en-US" sz="2400">
+                          <a:latin typeface="Open Sans" pitchFamily="2" charset="0"/>
+                          <a:ea typeface="Open Sans" pitchFamily="2" charset="0"/>
+                          <a:cs typeface="Open Sans" pitchFamily="2" charset="0"/>
+                        </a:rPr>
+                        <a:t>3 columns</a:t>
+                      </a:r>
+                    </a:p>
+                  </a:txBody>
+                  <a:tcPr anchor="ctr"/>
+                </a:tc>
+                <a:tc>
+                  <a:txBody>
+                    <a:bodyPr/>
+                    <a:lstStyle/>
+                    <a:p>
+                      <a:pPr>
+                        <a:buNone/>
+                      </a:pPr>
+                      <a:r>
+                        <a:rPr lang="en-US" sz="2400" dirty="0">
+                          <a:latin typeface="Open Sans" pitchFamily="2" charset="0"/>
+                          <a:ea typeface="Open Sans" pitchFamily="2" charset="0"/>
+                          <a:cs typeface="Open Sans" pitchFamily="2" charset="0"/>
+                        </a:rPr>
+                        <a:t>2 columns</a:t>
+                      </a:r>
+                    </a:p>
+                  </a:txBody>
+                  <a:tcPr anchor="ctr"/>
+                </a:tc>
+                <a:extLst>
+                  <a:ext uri="{0D108BD9-81ED-4DB2-BD59-A6C34878D82A}">
+                    <a16:rowId xmlns:a16="http://schemas.microsoft.com/office/drawing/2014/main" val="2942994990"/>
+                  </a:ext>
+                </a:extLst>
+              </a:tr>
+            </a:tbl>
+          </a:graphicData>
+        </a:graphic>
+      </p:graphicFrame>
+    </p:spTree>
+    <p:extLst>
+      <p:ext uri="{BB962C8B-B14F-4D97-AF65-F5344CB8AC3E}">
+        <p14:creationId xmlns:p14="http://schemas.microsoft.com/office/powerpoint/2010/main" val="3598121037"/>
+      </p:ext>
+    </p:extLst>
+  </p:cSld>
+  <p:clrMapOvr>
+    <a:masterClrMapping/>
+  </p:clrMapOvr>
+</p:sld>
+</file>
+
 <file path=ppt/slides/slide2.xml><?xml version="1.0" encoding="utf-8"?>
 <p:sld xmlns:a="http://schemas.openxmlformats.org/drawingml/2006/main" xmlns:r="http://schemas.openxmlformats.org/officeDocument/2006/relationships" xmlns:p="http://schemas.openxmlformats.org/presentationml/2006/main">
   <p:cSld>

</xml_diff>